<commit_message>
Design: update the design doc
1) refact the structure
2) Add the architecture
3) Add core desgins

Signed-off-by: Dong Yuan <yuandong1222@gmail.com>
</commit_message>
<xml_diff>
--- a/doc/pic.pptx
+++ b/doc/pic.pptx
@@ -6,8 +6,9 @@
   </p:sldMasterIdLst>
   <p:sldIdLst>
     <p:sldId id="256" r:id="rId2"/>
-    <p:sldId id="257" r:id="rId3"/>
-    <p:sldId id="258" r:id="rId4"/>
+    <p:sldId id="259" r:id="rId3"/>
+    <p:sldId id="257" r:id="rId4"/>
+    <p:sldId id="258" r:id="rId5"/>
   </p:sldIdLst>
   <p:sldSz cx="12192000" cy="6858000"/>
   <p:notesSz cx="6858000" cy="9144000"/>
@@ -106,6 +107,11 @@
       </a:defRPr>
     </a:lvl9pPr>
   </p:defaultTextStyle>
+  <p:extLst>
+    <p:ext uri="{EFAFB233-063F-42B5-8137-9DF3F51BA10A}">
+      <p15:sldGuideLst xmlns:p15="http://schemas.microsoft.com/office/powerpoint/2012/main"/>
+    </p:ext>
+  </p:extLst>
 </p:presentation>
 </file>
 
@@ -240,7 +246,7 @@
           <a:p>
             <a:fld id="{0BFDC94F-F344-9C4E-A3D8-927C44D5FDAF}" type="datetimeFigureOut">
               <a:rPr kumimoji="1" lang="zh-CN" altLang="en-US" smtClean="0"/>
-              <a:t>15/12/7</a:t>
+              <a:t>15/12/10</a:t>
             </a:fld>
             <a:endParaRPr kumimoji="1" lang="zh-CN" altLang="en-US"/>
           </a:p>
@@ -410,7 +416,7 @@
           <a:p>
             <a:fld id="{0BFDC94F-F344-9C4E-A3D8-927C44D5FDAF}" type="datetimeFigureOut">
               <a:rPr kumimoji="1" lang="zh-CN" altLang="en-US" smtClean="0"/>
-              <a:t>15/12/7</a:t>
+              <a:t>15/12/10</a:t>
             </a:fld>
             <a:endParaRPr kumimoji="1" lang="zh-CN" altLang="en-US"/>
           </a:p>
@@ -590,7 +596,7 @@
           <a:p>
             <a:fld id="{0BFDC94F-F344-9C4E-A3D8-927C44D5FDAF}" type="datetimeFigureOut">
               <a:rPr kumimoji="1" lang="zh-CN" altLang="en-US" smtClean="0"/>
-              <a:t>15/12/7</a:t>
+              <a:t>15/12/10</a:t>
             </a:fld>
             <a:endParaRPr kumimoji="1" lang="zh-CN" altLang="en-US"/>
           </a:p>
@@ -760,7 +766,7 @@
           <a:p>
             <a:fld id="{0BFDC94F-F344-9C4E-A3D8-927C44D5FDAF}" type="datetimeFigureOut">
               <a:rPr kumimoji="1" lang="zh-CN" altLang="en-US" smtClean="0"/>
-              <a:t>15/12/7</a:t>
+              <a:t>15/12/10</a:t>
             </a:fld>
             <a:endParaRPr kumimoji="1" lang="zh-CN" altLang="en-US"/>
           </a:p>
@@ -1006,7 +1012,7 @@
           <a:p>
             <a:fld id="{0BFDC94F-F344-9C4E-A3D8-927C44D5FDAF}" type="datetimeFigureOut">
               <a:rPr kumimoji="1" lang="zh-CN" altLang="en-US" smtClean="0"/>
-              <a:t>15/12/7</a:t>
+              <a:t>15/12/10</a:t>
             </a:fld>
             <a:endParaRPr kumimoji="1" lang="zh-CN" altLang="en-US"/>
           </a:p>
@@ -1238,7 +1244,7 @@
           <a:p>
             <a:fld id="{0BFDC94F-F344-9C4E-A3D8-927C44D5FDAF}" type="datetimeFigureOut">
               <a:rPr kumimoji="1" lang="zh-CN" altLang="en-US" smtClean="0"/>
-              <a:t>15/12/7</a:t>
+              <a:t>15/12/10</a:t>
             </a:fld>
             <a:endParaRPr kumimoji="1" lang="zh-CN" altLang="en-US"/>
           </a:p>
@@ -1605,7 +1611,7 @@
           <a:p>
             <a:fld id="{0BFDC94F-F344-9C4E-A3D8-927C44D5FDAF}" type="datetimeFigureOut">
               <a:rPr kumimoji="1" lang="zh-CN" altLang="en-US" smtClean="0"/>
-              <a:t>15/12/7</a:t>
+              <a:t>15/12/10</a:t>
             </a:fld>
             <a:endParaRPr kumimoji="1" lang="zh-CN" altLang="en-US"/>
           </a:p>
@@ -1723,7 +1729,7 @@
           <a:p>
             <a:fld id="{0BFDC94F-F344-9C4E-A3D8-927C44D5FDAF}" type="datetimeFigureOut">
               <a:rPr kumimoji="1" lang="zh-CN" altLang="en-US" smtClean="0"/>
-              <a:t>15/12/7</a:t>
+              <a:t>15/12/10</a:t>
             </a:fld>
             <a:endParaRPr kumimoji="1" lang="zh-CN" altLang="en-US"/>
           </a:p>
@@ -1818,7 +1824,7 @@
           <a:p>
             <a:fld id="{0BFDC94F-F344-9C4E-A3D8-927C44D5FDAF}" type="datetimeFigureOut">
               <a:rPr kumimoji="1" lang="zh-CN" altLang="en-US" smtClean="0"/>
-              <a:t>15/12/7</a:t>
+              <a:t>15/12/10</a:t>
             </a:fld>
             <a:endParaRPr kumimoji="1" lang="zh-CN" altLang="en-US"/>
           </a:p>
@@ -2095,7 +2101,7 @@
           <a:p>
             <a:fld id="{0BFDC94F-F344-9C4E-A3D8-927C44D5FDAF}" type="datetimeFigureOut">
               <a:rPr kumimoji="1" lang="zh-CN" altLang="en-US" smtClean="0"/>
-              <a:t>15/12/7</a:t>
+              <a:t>15/12/10</a:t>
             </a:fld>
             <a:endParaRPr kumimoji="1" lang="zh-CN" altLang="en-US"/>
           </a:p>
@@ -2348,7 +2354,7 @@
           <a:p>
             <a:fld id="{0BFDC94F-F344-9C4E-A3D8-927C44D5FDAF}" type="datetimeFigureOut">
               <a:rPr kumimoji="1" lang="zh-CN" altLang="en-US" smtClean="0"/>
-              <a:t>15/12/7</a:t>
+              <a:t>15/12/10</a:t>
             </a:fld>
             <a:endParaRPr kumimoji="1" lang="zh-CN" altLang="en-US"/>
           </a:p>
@@ -2561,7 +2567,7 @@
           <a:p>
             <a:fld id="{0BFDC94F-F344-9C4E-A3D8-927C44D5FDAF}" type="datetimeFigureOut">
               <a:rPr kumimoji="1" lang="zh-CN" altLang="en-US" smtClean="0"/>
-              <a:t>15/12/7</a:t>
+              <a:t>15/12/10</a:t>
             </a:fld>
             <a:endParaRPr kumimoji="1" lang="zh-CN" altLang="en-US"/>
           </a:p>
@@ -3313,6 +3319,1351 @@
       </p:grpSpPr>
       <p:sp>
         <p:nvSpPr>
+          <p:cNvPr id="29" name="矩形 28"/>
+          <p:cNvSpPr/>
+          <p:nvPr/>
+        </p:nvSpPr>
+        <p:spPr>
+          <a:xfrm>
+            <a:off x="3317430" y="3468323"/>
+            <a:ext cx="4537032" cy="2428386"/>
+          </a:xfrm>
+          <a:prstGeom prst="rect">
+            <a:avLst/>
+          </a:prstGeom>
+          <a:ln>
+            <a:solidFill>
+              <a:srgbClr val="FFC000"/>
+            </a:solidFill>
+            <a:prstDash val="dash"/>
+          </a:ln>
+        </p:spPr>
+        <p:style>
+          <a:lnRef idx="2">
+            <a:schemeClr val="accent1"/>
+          </a:lnRef>
+          <a:fillRef idx="1">
+            <a:schemeClr val="lt1"/>
+          </a:fillRef>
+          <a:effectRef idx="0">
+            <a:schemeClr val="accent1"/>
+          </a:effectRef>
+          <a:fontRef idx="minor">
+            <a:schemeClr val="dk1"/>
+          </a:fontRef>
+        </p:style>
+        <p:txBody>
+          <a:bodyPr rtlCol="0" anchor="t"/>
+          <a:lstStyle/>
+          <a:p>
+            <a:pPr algn="ctr"/>
+            <a:r>
+              <a:rPr kumimoji="1" lang="en-US" altLang="zh-CN" dirty="0" err="1" smtClean="0">
+                <a:solidFill>
+                  <a:schemeClr val="tx1"/>
+                </a:solidFill>
+              </a:rPr>
+              <a:t>osd</a:t>
+            </a:r>
+            <a:endParaRPr kumimoji="1" lang="zh-CN" altLang="en-US" dirty="0">
+              <a:solidFill>
+                <a:schemeClr val="tx1"/>
+              </a:solidFill>
+            </a:endParaRPr>
+          </a:p>
+        </p:txBody>
+      </p:sp>
+      <p:sp>
+        <p:nvSpPr>
+          <p:cNvPr id="28" name="矩形 27"/>
+          <p:cNvSpPr/>
+          <p:nvPr/>
+        </p:nvSpPr>
+        <p:spPr>
+          <a:xfrm>
+            <a:off x="2093214" y="1655353"/>
+            <a:ext cx="2526824" cy="949569"/>
+          </a:xfrm>
+          <a:prstGeom prst="rect">
+            <a:avLst/>
+          </a:prstGeom>
+          <a:ln>
+            <a:prstDash val="dash"/>
+          </a:ln>
+        </p:spPr>
+        <p:style>
+          <a:lnRef idx="2">
+            <a:schemeClr val="accent1"/>
+          </a:lnRef>
+          <a:fillRef idx="1">
+            <a:schemeClr val="lt1"/>
+          </a:fillRef>
+          <a:effectRef idx="0">
+            <a:schemeClr val="accent1"/>
+          </a:effectRef>
+          <a:fontRef idx="minor">
+            <a:schemeClr val="dk1"/>
+          </a:fontRef>
+        </p:style>
+        <p:txBody>
+          <a:bodyPr rtlCol="0" anchor="t"/>
+          <a:lstStyle/>
+          <a:p>
+            <a:pPr algn="ctr"/>
+            <a:r>
+              <a:rPr kumimoji="1" lang="en-US" altLang="zh-CN" dirty="0" smtClean="0">
+                <a:solidFill>
+                  <a:schemeClr val="tx1"/>
+                </a:solidFill>
+              </a:rPr>
+              <a:t>mon</a:t>
+            </a:r>
+            <a:endParaRPr kumimoji="1" lang="zh-CN" altLang="en-US" dirty="0">
+              <a:solidFill>
+                <a:schemeClr val="tx1"/>
+              </a:solidFill>
+            </a:endParaRPr>
+          </a:p>
+        </p:txBody>
+      </p:sp>
+      <p:sp>
+        <p:nvSpPr>
+          <p:cNvPr id="2" name="标题 1"/>
+          <p:cNvSpPr>
+            <a:spLocks noGrp="1"/>
+          </p:cNvSpPr>
+          <p:nvPr>
+            <p:ph type="title"/>
+          </p:nvPr>
+        </p:nvSpPr>
+        <p:spPr/>
+        <p:txBody>
+          <a:bodyPr/>
+          <a:lstStyle/>
+          <a:p>
+            <a:r>
+              <a:rPr kumimoji="1" lang="en-US" altLang="zh-CN" dirty="0" smtClean="0"/>
+              <a:t>Architecture</a:t>
+            </a:r>
+            <a:endParaRPr kumimoji="1" lang="zh-CN" altLang="en-US" dirty="0"/>
+          </a:p>
+        </p:txBody>
+      </p:sp>
+      <p:sp>
+        <p:nvSpPr>
+          <p:cNvPr id="3" name="罐形 2"/>
+          <p:cNvSpPr/>
+          <p:nvPr/>
+        </p:nvSpPr>
+        <p:spPr>
+          <a:xfrm>
+            <a:off x="3528647" y="3833451"/>
+            <a:ext cx="469524" cy="514326"/>
+          </a:xfrm>
+          <a:prstGeom prst="can">
+            <a:avLst/>
+          </a:prstGeom>
+        </p:spPr>
+        <p:style>
+          <a:lnRef idx="2">
+            <a:schemeClr val="accent4">
+              <a:shade val="50000"/>
+            </a:schemeClr>
+          </a:lnRef>
+          <a:fillRef idx="1">
+            <a:schemeClr val="accent4"/>
+          </a:fillRef>
+          <a:effectRef idx="0">
+            <a:schemeClr val="accent4"/>
+          </a:effectRef>
+          <a:fontRef idx="minor">
+            <a:schemeClr val="lt1"/>
+          </a:fontRef>
+        </p:style>
+        <p:txBody>
+          <a:bodyPr rtlCol="0" anchor="ctr"/>
+          <a:lstStyle/>
+          <a:p>
+            <a:pPr algn="ctr"/>
+            <a:endParaRPr kumimoji="1" lang="zh-CN" altLang="en-US"/>
+          </a:p>
+        </p:txBody>
+      </p:sp>
+      <p:sp>
+        <p:nvSpPr>
+          <p:cNvPr id="4" name="罐形 3"/>
+          <p:cNvSpPr/>
+          <p:nvPr/>
+        </p:nvSpPr>
+        <p:spPr>
+          <a:xfrm>
+            <a:off x="4144008" y="3833451"/>
+            <a:ext cx="469524" cy="514326"/>
+          </a:xfrm>
+          <a:prstGeom prst="can">
+            <a:avLst/>
+          </a:prstGeom>
+        </p:spPr>
+        <p:style>
+          <a:lnRef idx="2">
+            <a:schemeClr val="accent4">
+              <a:shade val="50000"/>
+            </a:schemeClr>
+          </a:lnRef>
+          <a:fillRef idx="1">
+            <a:schemeClr val="accent4"/>
+          </a:fillRef>
+          <a:effectRef idx="0">
+            <a:schemeClr val="accent4"/>
+          </a:effectRef>
+          <a:fontRef idx="minor">
+            <a:schemeClr val="lt1"/>
+          </a:fontRef>
+        </p:style>
+        <p:txBody>
+          <a:bodyPr rtlCol="0" anchor="ctr"/>
+          <a:lstStyle/>
+          <a:p>
+            <a:pPr algn="ctr"/>
+            <a:endParaRPr kumimoji="1" lang="zh-CN" altLang="en-US"/>
+          </a:p>
+        </p:txBody>
+      </p:sp>
+      <p:sp>
+        <p:nvSpPr>
+          <p:cNvPr id="5" name="罐形 4"/>
+          <p:cNvSpPr/>
+          <p:nvPr/>
+        </p:nvSpPr>
+        <p:spPr>
+          <a:xfrm>
+            <a:off x="4759370" y="3833451"/>
+            <a:ext cx="469524" cy="514326"/>
+          </a:xfrm>
+          <a:prstGeom prst="can">
+            <a:avLst/>
+          </a:prstGeom>
+        </p:spPr>
+        <p:style>
+          <a:lnRef idx="2">
+            <a:schemeClr val="accent4">
+              <a:shade val="50000"/>
+            </a:schemeClr>
+          </a:lnRef>
+          <a:fillRef idx="1">
+            <a:schemeClr val="accent4"/>
+          </a:fillRef>
+          <a:effectRef idx="0">
+            <a:schemeClr val="accent4"/>
+          </a:effectRef>
+          <a:fontRef idx="minor">
+            <a:schemeClr val="lt1"/>
+          </a:fontRef>
+        </p:style>
+        <p:txBody>
+          <a:bodyPr rtlCol="0" anchor="ctr"/>
+          <a:lstStyle/>
+          <a:p>
+            <a:pPr algn="ctr"/>
+            <a:endParaRPr kumimoji="1" lang="zh-CN" altLang="en-US"/>
+          </a:p>
+        </p:txBody>
+      </p:sp>
+      <p:sp>
+        <p:nvSpPr>
+          <p:cNvPr id="6" name="罐形 5"/>
+          <p:cNvSpPr/>
+          <p:nvPr/>
+        </p:nvSpPr>
+        <p:spPr>
+          <a:xfrm>
+            <a:off x="5374731" y="3833451"/>
+            <a:ext cx="469524" cy="514326"/>
+          </a:xfrm>
+          <a:prstGeom prst="can">
+            <a:avLst/>
+          </a:prstGeom>
+        </p:spPr>
+        <p:style>
+          <a:lnRef idx="2">
+            <a:schemeClr val="accent4">
+              <a:shade val="50000"/>
+            </a:schemeClr>
+          </a:lnRef>
+          <a:fillRef idx="1">
+            <a:schemeClr val="accent4"/>
+          </a:fillRef>
+          <a:effectRef idx="0">
+            <a:schemeClr val="accent4"/>
+          </a:effectRef>
+          <a:fontRef idx="minor">
+            <a:schemeClr val="lt1"/>
+          </a:fontRef>
+        </p:style>
+        <p:txBody>
+          <a:bodyPr rtlCol="0" anchor="ctr"/>
+          <a:lstStyle/>
+          <a:p>
+            <a:pPr algn="ctr"/>
+            <a:endParaRPr kumimoji="1" lang="zh-CN" altLang="en-US"/>
+          </a:p>
+        </p:txBody>
+      </p:sp>
+      <p:sp>
+        <p:nvSpPr>
+          <p:cNvPr id="7" name="罐形 6"/>
+          <p:cNvSpPr/>
+          <p:nvPr/>
+        </p:nvSpPr>
+        <p:spPr>
+          <a:xfrm>
+            <a:off x="5990092" y="3833451"/>
+            <a:ext cx="469524" cy="514326"/>
+          </a:xfrm>
+          <a:prstGeom prst="can">
+            <a:avLst/>
+          </a:prstGeom>
+        </p:spPr>
+        <p:style>
+          <a:lnRef idx="2">
+            <a:schemeClr val="accent4">
+              <a:shade val="50000"/>
+            </a:schemeClr>
+          </a:lnRef>
+          <a:fillRef idx="1">
+            <a:schemeClr val="accent4"/>
+          </a:fillRef>
+          <a:effectRef idx="0">
+            <a:schemeClr val="accent4"/>
+          </a:effectRef>
+          <a:fontRef idx="minor">
+            <a:schemeClr val="lt1"/>
+          </a:fontRef>
+        </p:style>
+        <p:txBody>
+          <a:bodyPr rtlCol="0" anchor="ctr"/>
+          <a:lstStyle/>
+          <a:p>
+            <a:pPr algn="ctr"/>
+            <a:endParaRPr kumimoji="1" lang="zh-CN" altLang="en-US"/>
+          </a:p>
+        </p:txBody>
+      </p:sp>
+      <p:sp>
+        <p:nvSpPr>
+          <p:cNvPr id="8" name="罐形 7"/>
+          <p:cNvSpPr/>
+          <p:nvPr/>
+        </p:nvSpPr>
+        <p:spPr>
+          <a:xfrm>
+            <a:off x="6605453" y="3833450"/>
+            <a:ext cx="469524" cy="514326"/>
+          </a:xfrm>
+          <a:prstGeom prst="can">
+            <a:avLst/>
+          </a:prstGeom>
+        </p:spPr>
+        <p:style>
+          <a:lnRef idx="2">
+            <a:schemeClr val="accent4">
+              <a:shade val="50000"/>
+            </a:schemeClr>
+          </a:lnRef>
+          <a:fillRef idx="1">
+            <a:schemeClr val="accent4"/>
+          </a:fillRef>
+          <a:effectRef idx="0">
+            <a:schemeClr val="accent4"/>
+          </a:effectRef>
+          <a:fontRef idx="minor">
+            <a:schemeClr val="lt1"/>
+          </a:fontRef>
+        </p:style>
+        <p:txBody>
+          <a:bodyPr rtlCol="0" anchor="ctr"/>
+          <a:lstStyle/>
+          <a:p>
+            <a:pPr algn="ctr"/>
+            <a:endParaRPr kumimoji="1" lang="zh-CN" altLang="en-US"/>
+          </a:p>
+        </p:txBody>
+      </p:sp>
+      <p:sp>
+        <p:nvSpPr>
+          <p:cNvPr id="9" name="罐形 8"/>
+          <p:cNvSpPr/>
+          <p:nvPr/>
+        </p:nvSpPr>
+        <p:spPr>
+          <a:xfrm>
+            <a:off x="7220815" y="3833450"/>
+            <a:ext cx="469524" cy="514326"/>
+          </a:xfrm>
+          <a:prstGeom prst="can">
+            <a:avLst/>
+          </a:prstGeom>
+        </p:spPr>
+        <p:style>
+          <a:lnRef idx="2">
+            <a:schemeClr val="accent4">
+              <a:shade val="50000"/>
+            </a:schemeClr>
+          </a:lnRef>
+          <a:fillRef idx="1">
+            <a:schemeClr val="accent4"/>
+          </a:fillRef>
+          <a:effectRef idx="0">
+            <a:schemeClr val="accent4"/>
+          </a:effectRef>
+          <a:fontRef idx="minor">
+            <a:schemeClr val="lt1"/>
+          </a:fontRef>
+        </p:style>
+        <p:txBody>
+          <a:bodyPr rtlCol="0" anchor="ctr"/>
+          <a:lstStyle/>
+          <a:p>
+            <a:pPr algn="ctr"/>
+            <a:endParaRPr kumimoji="1" lang="zh-CN" altLang="en-US"/>
+          </a:p>
+        </p:txBody>
+      </p:sp>
+      <p:sp>
+        <p:nvSpPr>
+          <p:cNvPr id="10" name="罐形 9"/>
+          <p:cNvSpPr/>
+          <p:nvPr/>
+        </p:nvSpPr>
+        <p:spPr>
+          <a:xfrm>
+            <a:off x="3528647" y="4555167"/>
+            <a:ext cx="469524" cy="514326"/>
+          </a:xfrm>
+          <a:prstGeom prst="can">
+            <a:avLst/>
+          </a:prstGeom>
+        </p:spPr>
+        <p:style>
+          <a:lnRef idx="2">
+            <a:schemeClr val="accent4">
+              <a:shade val="50000"/>
+            </a:schemeClr>
+          </a:lnRef>
+          <a:fillRef idx="1">
+            <a:schemeClr val="accent4"/>
+          </a:fillRef>
+          <a:effectRef idx="0">
+            <a:schemeClr val="accent4"/>
+          </a:effectRef>
+          <a:fontRef idx="minor">
+            <a:schemeClr val="lt1"/>
+          </a:fontRef>
+        </p:style>
+        <p:txBody>
+          <a:bodyPr rtlCol="0" anchor="ctr"/>
+          <a:lstStyle/>
+          <a:p>
+            <a:pPr algn="ctr"/>
+            <a:endParaRPr kumimoji="1" lang="zh-CN" altLang="en-US"/>
+          </a:p>
+        </p:txBody>
+      </p:sp>
+      <p:sp>
+        <p:nvSpPr>
+          <p:cNvPr id="11" name="罐形 10"/>
+          <p:cNvSpPr/>
+          <p:nvPr/>
+        </p:nvSpPr>
+        <p:spPr>
+          <a:xfrm>
+            <a:off x="4144008" y="4555167"/>
+            <a:ext cx="469524" cy="514326"/>
+          </a:xfrm>
+          <a:prstGeom prst="can">
+            <a:avLst/>
+          </a:prstGeom>
+        </p:spPr>
+        <p:style>
+          <a:lnRef idx="2">
+            <a:schemeClr val="accent4">
+              <a:shade val="50000"/>
+            </a:schemeClr>
+          </a:lnRef>
+          <a:fillRef idx="1">
+            <a:schemeClr val="accent4"/>
+          </a:fillRef>
+          <a:effectRef idx="0">
+            <a:schemeClr val="accent4"/>
+          </a:effectRef>
+          <a:fontRef idx="minor">
+            <a:schemeClr val="lt1"/>
+          </a:fontRef>
+        </p:style>
+        <p:txBody>
+          <a:bodyPr rtlCol="0" anchor="ctr"/>
+          <a:lstStyle/>
+          <a:p>
+            <a:pPr algn="ctr"/>
+            <a:endParaRPr kumimoji="1" lang="zh-CN" altLang="en-US"/>
+          </a:p>
+        </p:txBody>
+      </p:sp>
+      <p:sp>
+        <p:nvSpPr>
+          <p:cNvPr id="12" name="罐形 11"/>
+          <p:cNvSpPr/>
+          <p:nvPr/>
+        </p:nvSpPr>
+        <p:spPr>
+          <a:xfrm>
+            <a:off x="4759370" y="4555167"/>
+            <a:ext cx="469524" cy="514326"/>
+          </a:xfrm>
+          <a:prstGeom prst="can">
+            <a:avLst/>
+          </a:prstGeom>
+        </p:spPr>
+        <p:style>
+          <a:lnRef idx="2">
+            <a:schemeClr val="accent4">
+              <a:shade val="50000"/>
+            </a:schemeClr>
+          </a:lnRef>
+          <a:fillRef idx="1">
+            <a:schemeClr val="accent4"/>
+          </a:fillRef>
+          <a:effectRef idx="0">
+            <a:schemeClr val="accent4"/>
+          </a:effectRef>
+          <a:fontRef idx="minor">
+            <a:schemeClr val="lt1"/>
+          </a:fontRef>
+        </p:style>
+        <p:txBody>
+          <a:bodyPr rtlCol="0" anchor="ctr"/>
+          <a:lstStyle/>
+          <a:p>
+            <a:pPr algn="ctr"/>
+            <a:endParaRPr kumimoji="1" lang="zh-CN" altLang="en-US"/>
+          </a:p>
+        </p:txBody>
+      </p:sp>
+      <p:sp>
+        <p:nvSpPr>
+          <p:cNvPr id="13" name="罐形 12"/>
+          <p:cNvSpPr/>
+          <p:nvPr/>
+        </p:nvSpPr>
+        <p:spPr>
+          <a:xfrm>
+            <a:off x="5374731" y="4555167"/>
+            <a:ext cx="469524" cy="514326"/>
+          </a:xfrm>
+          <a:prstGeom prst="can">
+            <a:avLst/>
+          </a:prstGeom>
+        </p:spPr>
+        <p:style>
+          <a:lnRef idx="2">
+            <a:schemeClr val="accent4">
+              <a:shade val="50000"/>
+            </a:schemeClr>
+          </a:lnRef>
+          <a:fillRef idx="1">
+            <a:schemeClr val="accent4"/>
+          </a:fillRef>
+          <a:effectRef idx="0">
+            <a:schemeClr val="accent4"/>
+          </a:effectRef>
+          <a:fontRef idx="minor">
+            <a:schemeClr val="lt1"/>
+          </a:fontRef>
+        </p:style>
+        <p:txBody>
+          <a:bodyPr rtlCol="0" anchor="ctr"/>
+          <a:lstStyle/>
+          <a:p>
+            <a:pPr algn="ctr"/>
+            <a:endParaRPr kumimoji="1" lang="zh-CN" altLang="en-US"/>
+          </a:p>
+        </p:txBody>
+      </p:sp>
+      <p:sp>
+        <p:nvSpPr>
+          <p:cNvPr id="14" name="罐形 13"/>
+          <p:cNvSpPr/>
+          <p:nvPr/>
+        </p:nvSpPr>
+        <p:spPr>
+          <a:xfrm>
+            <a:off x="5990092" y="4555166"/>
+            <a:ext cx="469524" cy="514326"/>
+          </a:xfrm>
+          <a:prstGeom prst="can">
+            <a:avLst/>
+          </a:prstGeom>
+        </p:spPr>
+        <p:style>
+          <a:lnRef idx="2">
+            <a:schemeClr val="accent4">
+              <a:shade val="50000"/>
+            </a:schemeClr>
+          </a:lnRef>
+          <a:fillRef idx="1">
+            <a:schemeClr val="accent4"/>
+          </a:fillRef>
+          <a:effectRef idx="0">
+            <a:schemeClr val="accent4"/>
+          </a:effectRef>
+          <a:fontRef idx="minor">
+            <a:schemeClr val="lt1"/>
+          </a:fontRef>
+        </p:style>
+        <p:txBody>
+          <a:bodyPr rtlCol="0" anchor="ctr"/>
+          <a:lstStyle/>
+          <a:p>
+            <a:pPr algn="ctr"/>
+            <a:endParaRPr kumimoji="1" lang="zh-CN" altLang="en-US"/>
+          </a:p>
+        </p:txBody>
+      </p:sp>
+      <p:sp>
+        <p:nvSpPr>
+          <p:cNvPr id="15" name="罐形 14"/>
+          <p:cNvSpPr/>
+          <p:nvPr/>
+        </p:nvSpPr>
+        <p:spPr>
+          <a:xfrm>
+            <a:off x="6605453" y="4555166"/>
+            <a:ext cx="469524" cy="514326"/>
+          </a:xfrm>
+          <a:prstGeom prst="can">
+            <a:avLst/>
+          </a:prstGeom>
+        </p:spPr>
+        <p:style>
+          <a:lnRef idx="2">
+            <a:schemeClr val="accent4">
+              <a:shade val="50000"/>
+            </a:schemeClr>
+          </a:lnRef>
+          <a:fillRef idx="1">
+            <a:schemeClr val="accent4"/>
+          </a:fillRef>
+          <a:effectRef idx="0">
+            <a:schemeClr val="accent4"/>
+          </a:effectRef>
+          <a:fontRef idx="minor">
+            <a:schemeClr val="lt1"/>
+          </a:fontRef>
+        </p:style>
+        <p:txBody>
+          <a:bodyPr rtlCol="0" anchor="ctr"/>
+          <a:lstStyle/>
+          <a:p>
+            <a:pPr algn="ctr"/>
+            <a:endParaRPr kumimoji="1" lang="zh-CN" altLang="en-US"/>
+          </a:p>
+        </p:txBody>
+      </p:sp>
+      <p:sp>
+        <p:nvSpPr>
+          <p:cNvPr id="16" name="罐形 15"/>
+          <p:cNvSpPr/>
+          <p:nvPr/>
+        </p:nvSpPr>
+        <p:spPr>
+          <a:xfrm>
+            <a:off x="7220815" y="4555166"/>
+            <a:ext cx="469524" cy="514326"/>
+          </a:xfrm>
+          <a:prstGeom prst="can">
+            <a:avLst/>
+          </a:prstGeom>
+        </p:spPr>
+        <p:style>
+          <a:lnRef idx="2">
+            <a:schemeClr val="accent4">
+              <a:shade val="50000"/>
+            </a:schemeClr>
+          </a:lnRef>
+          <a:fillRef idx="1">
+            <a:schemeClr val="accent4"/>
+          </a:fillRef>
+          <a:effectRef idx="0">
+            <a:schemeClr val="accent4"/>
+          </a:effectRef>
+          <a:fontRef idx="minor">
+            <a:schemeClr val="lt1"/>
+          </a:fontRef>
+        </p:style>
+        <p:txBody>
+          <a:bodyPr rtlCol="0" anchor="ctr"/>
+          <a:lstStyle/>
+          <a:p>
+            <a:pPr algn="ctr"/>
+            <a:endParaRPr kumimoji="1" lang="zh-CN" altLang="en-US"/>
+          </a:p>
+        </p:txBody>
+      </p:sp>
+      <p:sp>
+        <p:nvSpPr>
+          <p:cNvPr id="17" name="罐形 16"/>
+          <p:cNvSpPr/>
+          <p:nvPr/>
+        </p:nvSpPr>
+        <p:spPr>
+          <a:xfrm>
+            <a:off x="3528647" y="5276881"/>
+            <a:ext cx="469524" cy="514326"/>
+          </a:xfrm>
+          <a:prstGeom prst="can">
+            <a:avLst/>
+          </a:prstGeom>
+        </p:spPr>
+        <p:style>
+          <a:lnRef idx="2">
+            <a:schemeClr val="accent4">
+              <a:shade val="50000"/>
+            </a:schemeClr>
+          </a:lnRef>
+          <a:fillRef idx="1">
+            <a:schemeClr val="accent4"/>
+          </a:fillRef>
+          <a:effectRef idx="0">
+            <a:schemeClr val="accent4"/>
+          </a:effectRef>
+          <a:fontRef idx="minor">
+            <a:schemeClr val="lt1"/>
+          </a:fontRef>
+        </p:style>
+        <p:txBody>
+          <a:bodyPr rtlCol="0" anchor="ctr"/>
+          <a:lstStyle/>
+          <a:p>
+            <a:pPr algn="ctr"/>
+            <a:endParaRPr kumimoji="1" lang="zh-CN" altLang="en-US"/>
+          </a:p>
+        </p:txBody>
+      </p:sp>
+      <p:sp>
+        <p:nvSpPr>
+          <p:cNvPr id="18" name="罐形 17"/>
+          <p:cNvSpPr/>
+          <p:nvPr/>
+        </p:nvSpPr>
+        <p:spPr>
+          <a:xfrm>
+            <a:off x="4144008" y="5276881"/>
+            <a:ext cx="469524" cy="514326"/>
+          </a:xfrm>
+          <a:prstGeom prst="can">
+            <a:avLst/>
+          </a:prstGeom>
+        </p:spPr>
+        <p:style>
+          <a:lnRef idx="2">
+            <a:schemeClr val="accent4">
+              <a:shade val="50000"/>
+            </a:schemeClr>
+          </a:lnRef>
+          <a:fillRef idx="1">
+            <a:schemeClr val="accent4"/>
+          </a:fillRef>
+          <a:effectRef idx="0">
+            <a:schemeClr val="accent4"/>
+          </a:effectRef>
+          <a:fontRef idx="minor">
+            <a:schemeClr val="lt1"/>
+          </a:fontRef>
+        </p:style>
+        <p:txBody>
+          <a:bodyPr rtlCol="0" anchor="ctr"/>
+          <a:lstStyle/>
+          <a:p>
+            <a:pPr algn="ctr"/>
+            <a:endParaRPr kumimoji="1" lang="zh-CN" altLang="en-US"/>
+          </a:p>
+        </p:txBody>
+      </p:sp>
+      <p:sp>
+        <p:nvSpPr>
+          <p:cNvPr id="19" name="罐形 18"/>
+          <p:cNvSpPr/>
+          <p:nvPr/>
+        </p:nvSpPr>
+        <p:spPr>
+          <a:xfrm>
+            <a:off x="4759370" y="5276881"/>
+            <a:ext cx="469524" cy="514326"/>
+          </a:xfrm>
+          <a:prstGeom prst="can">
+            <a:avLst/>
+          </a:prstGeom>
+        </p:spPr>
+        <p:style>
+          <a:lnRef idx="2">
+            <a:schemeClr val="accent4">
+              <a:shade val="50000"/>
+            </a:schemeClr>
+          </a:lnRef>
+          <a:fillRef idx="1">
+            <a:schemeClr val="accent4"/>
+          </a:fillRef>
+          <a:effectRef idx="0">
+            <a:schemeClr val="accent4"/>
+          </a:effectRef>
+          <a:fontRef idx="minor">
+            <a:schemeClr val="lt1"/>
+          </a:fontRef>
+        </p:style>
+        <p:txBody>
+          <a:bodyPr rtlCol="0" anchor="ctr"/>
+          <a:lstStyle/>
+          <a:p>
+            <a:pPr algn="ctr"/>
+            <a:endParaRPr kumimoji="1" lang="zh-CN" altLang="en-US"/>
+          </a:p>
+        </p:txBody>
+      </p:sp>
+      <p:sp>
+        <p:nvSpPr>
+          <p:cNvPr id="20" name="罐形 19"/>
+          <p:cNvSpPr/>
+          <p:nvPr/>
+        </p:nvSpPr>
+        <p:spPr>
+          <a:xfrm>
+            <a:off x="5374731" y="5276881"/>
+            <a:ext cx="469524" cy="514326"/>
+          </a:xfrm>
+          <a:prstGeom prst="can">
+            <a:avLst/>
+          </a:prstGeom>
+        </p:spPr>
+        <p:style>
+          <a:lnRef idx="2">
+            <a:schemeClr val="accent4">
+              <a:shade val="50000"/>
+            </a:schemeClr>
+          </a:lnRef>
+          <a:fillRef idx="1">
+            <a:schemeClr val="accent4"/>
+          </a:fillRef>
+          <a:effectRef idx="0">
+            <a:schemeClr val="accent4"/>
+          </a:effectRef>
+          <a:fontRef idx="minor">
+            <a:schemeClr val="lt1"/>
+          </a:fontRef>
+        </p:style>
+        <p:txBody>
+          <a:bodyPr rtlCol="0" anchor="ctr"/>
+          <a:lstStyle/>
+          <a:p>
+            <a:pPr algn="ctr"/>
+            <a:endParaRPr kumimoji="1" lang="zh-CN" altLang="en-US"/>
+          </a:p>
+        </p:txBody>
+      </p:sp>
+      <p:sp>
+        <p:nvSpPr>
+          <p:cNvPr id="21" name="罐形 20"/>
+          <p:cNvSpPr/>
+          <p:nvPr/>
+        </p:nvSpPr>
+        <p:spPr>
+          <a:xfrm>
+            <a:off x="5990092" y="5276880"/>
+            <a:ext cx="469524" cy="514326"/>
+          </a:xfrm>
+          <a:prstGeom prst="can">
+            <a:avLst/>
+          </a:prstGeom>
+        </p:spPr>
+        <p:style>
+          <a:lnRef idx="2">
+            <a:schemeClr val="accent4">
+              <a:shade val="50000"/>
+            </a:schemeClr>
+          </a:lnRef>
+          <a:fillRef idx="1">
+            <a:schemeClr val="accent4"/>
+          </a:fillRef>
+          <a:effectRef idx="0">
+            <a:schemeClr val="accent4"/>
+          </a:effectRef>
+          <a:fontRef idx="minor">
+            <a:schemeClr val="lt1"/>
+          </a:fontRef>
+        </p:style>
+        <p:txBody>
+          <a:bodyPr rtlCol="0" anchor="ctr"/>
+          <a:lstStyle/>
+          <a:p>
+            <a:pPr algn="ctr"/>
+            <a:endParaRPr kumimoji="1" lang="zh-CN" altLang="en-US"/>
+          </a:p>
+        </p:txBody>
+      </p:sp>
+      <p:sp>
+        <p:nvSpPr>
+          <p:cNvPr id="22" name="罐形 21"/>
+          <p:cNvSpPr/>
+          <p:nvPr/>
+        </p:nvSpPr>
+        <p:spPr>
+          <a:xfrm>
+            <a:off x="6605453" y="5276880"/>
+            <a:ext cx="469524" cy="514326"/>
+          </a:xfrm>
+          <a:prstGeom prst="can">
+            <a:avLst/>
+          </a:prstGeom>
+        </p:spPr>
+        <p:style>
+          <a:lnRef idx="2">
+            <a:schemeClr val="accent4">
+              <a:shade val="50000"/>
+            </a:schemeClr>
+          </a:lnRef>
+          <a:fillRef idx="1">
+            <a:schemeClr val="accent4"/>
+          </a:fillRef>
+          <a:effectRef idx="0">
+            <a:schemeClr val="accent4"/>
+          </a:effectRef>
+          <a:fontRef idx="minor">
+            <a:schemeClr val="lt1"/>
+          </a:fontRef>
+        </p:style>
+        <p:txBody>
+          <a:bodyPr rtlCol="0" anchor="ctr"/>
+          <a:lstStyle/>
+          <a:p>
+            <a:pPr algn="ctr"/>
+            <a:endParaRPr kumimoji="1" lang="zh-CN" altLang="en-US"/>
+          </a:p>
+        </p:txBody>
+      </p:sp>
+      <p:sp>
+        <p:nvSpPr>
+          <p:cNvPr id="23" name="罐形 22"/>
+          <p:cNvSpPr/>
+          <p:nvPr/>
+        </p:nvSpPr>
+        <p:spPr>
+          <a:xfrm>
+            <a:off x="7220815" y="5276880"/>
+            <a:ext cx="469524" cy="514326"/>
+          </a:xfrm>
+          <a:prstGeom prst="can">
+            <a:avLst/>
+          </a:prstGeom>
+        </p:spPr>
+        <p:style>
+          <a:lnRef idx="2">
+            <a:schemeClr val="accent4">
+              <a:shade val="50000"/>
+            </a:schemeClr>
+          </a:lnRef>
+          <a:fillRef idx="1">
+            <a:schemeClr val="accent4"/>
+          </a:fillRef>
+          <a:effectRef idx="0">
+            <a:schemeClr val="accent4"/>
+          </a:effectRef>
+          <a:fontRef idx="minor">
+            <a:schemeClr val="lt1"/>
+          </a:fontRef>
+        </p:style>
+        <p:txBody>
+          <a:bodyPr rtlCol="0" anchor="ctr"/>
+          <a:lstStyle/>
+          <a:p>
+            <a:pPr algn="ctr"/>
+            <a:endParaRPr kumimoji="1" lang="zh-CN" altLang="en-US"/>
+          </a:p>
+        </p:txBody>
+      </p:sp>
+      <p:sp>
+        <p:nvSpPr>
+          <p:cNvPr id="25" name="可选流程 24"/>
+          <p:cNvSpPr/>
+          <p:nvPr/>
+        </p:nvSpPr>
+        <p:spPr>
+          <a:xfrm>
+            <a:off x="2409741" y="2042215"/>
+            <a:ext cx="504093" cy="433754"/>
+          </a:xfrm>
+          <a:prstGeom prst="flowChartAlternateProcess">
+            <a:avLst/>
+          </a:prstGeom>
+        </p:spPr>
+        <p:style>
+          <a:lnRef idx="2">
+            <a:schemeClr val="accent1">
+              <a:shade val="50000"/>
+            </a:schemeClr>
+          </a:lnRef>
+          <a:fillRef idx="1">
+            <a:schemeClr val="accent1"/>
+          </a:fillRef>
+          <a:effectRef idx="0">
+            <a:schemeClr val="accent1"/>
+          </a:effectRef>
+          <a:fontRef idx="minor">
+            <a:schemeClr val="lt1"/>
+          </a:fontRef>
+        </p:style>
+        <p:txBody>
+          <a:bodyPr rtlCol="0" anchor="ctr"/>
+          <a:lstStyle/>
+          <a:p>
+            <a:pPr algn="ctr"/>
+            <a:r>
+              <a:rPr kumimoji="1" lang="en-US" altLang="zh-CN" sz="700" dirty="0" err="1" smtClean="0"/>
+              <a:t>mon.a</a:t>
+            </a:r>
+            <a:endParaRPr kumimoji="1" lang="zh-CN" altLang="en-US" sz="700" dirty="0"/>
+          </a:p>
+        </p:txBody>
+      </p:sp>
+      <p:sp>
+        <p:nvSpPr>
+          <p:cNvPr id="26" name="可选流程 25"/>
+          <p:cNvSpPr/>
+          <p:nvPr/>
+        </p:nvSpPr>
+        <p:spPr>
+          <a:xfrm>
+            <a:off x="3131311" y="2042215"/>
+            <a:ext cx="504093" cy="433754"/>
+          </a:xfrm>
+          <a:prstGeom prst="flowChartAlternateProcess">
+            <a:avLst/>
+          </a:prstGeom>
+        </p:spPr>
+        <p:style>
+          <a:lnRef idx="2">
+            <a:schemeClr val="accent1">
+              <a:shade val="50000"/>
+            </a:schemeClr>
+          </a:lnRef>
+          <a:fillRef idx="1">
+            <a:schemeClr val="accent1"/>
+          </a:fillRef>
+          <a:effectRef idx="0">
+            <a:schemeClr val="accent1"/>
+          </a:effectRef>
+          <a:fontRef idx="minor">
+            <a:schemeClr val="lt1"/>
+          </a:fontRef>
+        </p:style>
+        <p:txBody>
+          <a:bodyPr rtlCol="0" anchor="ctr"/>
+          <a:lstStyle/>
+          <a:p>
+            <a:pPr algn="ctr"/>
+            <a:r>
+              <a:rPr kumimoji="1" lang="en-US" altLang="zh-CN" sz="700" dirty="0" err="1" smtClean="0"/>
+              <a:t>mon.b</a:t>
+            </a:r>
+            <a:endParaRPr kumimoji="1" lang="zh-CN" altLang="en-US" sz="700" dirty="0"/>
+          </a:p>
+        </p:txBody>
+      </p:sp>
+      <p:sp>
+        <p:nvSpPr>
+          <p:cNvPr id="27" name="可选流程 26"/>
+          <p:cNvSpPr/>
+          <p:nvPr/>
+        </p:nvSpPr>
+        <p:spPr>
+          <a:xfrm>
+            <a:off x="3852881" y="2053938"/>
+            <a:ext cx="504093" cy="433754"/>
+          </a:xfrm>
+          <a:prstGeom prst="flowChartAlternateProcess">
+            <a:avLst/>
+          </a:prstGeom>
+        </p:spPr>
+        <p:style>
+          <a:lnRef idx="2">
+            <a:schemeClr val="accent1">
+              <a:shade val="50000"/>
+            </a:schemeClr>
+          </a:lnRef>
+          <a:fillRef idx="1">
+            <a:schemeClr val="accent1"/>
+          </a:fillRef>
+          <a:effectRef idx="0">
+            <a:schemeClr val="accent1"/>
+          </a:effectRef>
+          <a:fontRef idx="minor">
+            <a:schemeClr val="lt1"/>
+          </a:fontRef>
+        </p:style>
+        <p:txBody>
+          <a:bodyPr rtlCol="0" anchor="ctr"/>
+          <a:lstStyle/>
+          <a:p>
+            <a:pPr algn="ctr"/>
+            <a:r>
+              <a:rPr kumimoji="1" lang="en-US" altLang="zh-CN" sz="700" dirty="0" err="1" smtClean="0"/>
+              <a:t>mon.c</a:t>
+            </a:r>
+            <a:endParaRPr kumimoji="1" lang="zh-CN" altLang="en-US" sz="700" dirty="0"/>
+          </a:p>
+        </p:txBody>
+      </p:sp>
+      <p:grpSp>
+        <p:nvGrpSpPr>
+          <p:cNvPr id="45" name="组 44"/>
+          <p:cNvGrpSpPr/>
+          <p:nvPr/>
+        </p:nvGrpSpPr>
+        <p:grpSpPr>
+          <a:xfrm>
+            <a:off x="7444476" y="1630833"/>
+            <a:ext cx="1084886" cy="642666"/>
+            <a:chOff x="7444476" y="1630833"/>
+            <a:chExt cx="1084886" cy="642666"/>
+          </a:xfrm>
+        </p:grpSpPr>
+        <p:sp>
+          <p:nvSpPr>
+            <p:cNvPr id="30" name="矩形 29"/>
+            <p:cNvSpPr/>
+            <p:nvPr/>
+          </p:nvSpPr>
+          <p:spPr>
+            <a:xfrm>
+              <a:off x="7444476" y="1956974"/>
+              <a:ext cx="1084886" cy="316525"/>
+            </a:xfrm>
+            <a:prstGeom prst="rect">
+              <a:avLst/>
+            </a:prstGeom>
+          </p:spPr>
+          <p:style>
+            <a:lnRef idx="2">
+              <a:schemeClr val="accent6">
+                <a:shade val="50000"/>
+              </a:schemeClr>
+            </a:lnRef>
+            <a:fillRef idx="1">
+              <a:schemeClr val="accent6"/>
+            </a:fillRef>
+            <a:effectRef idx="0">
+              <a:schemeClr val="accent6"/>
+            </a:effectRef>
+            <a:fontRef idx="minor">
+              <a:schemeClr val="lt1"/>
+            </a:fontRef>
+          </p:style>
+          <p:txBody>
+            <a:bodyPr rtlCol="0" anchor="ctr"/>
+            <a:lstStyle/>
+            <a:p>
+              <a:pPr algn="ctr"/>
+              <a:r>
+                <a:rPr kumimoji="1" lang="en-US" altLang="zh-CN" dirty="0" smtClean="0"/>
+                <a:t>client</a:t>
+              </a:r>
+              <a:endParaRPr kumimoji="1" lang="zh-CN" altLang="en-US" dirty="0"/>
+            </a:p>
+          </p:txBody>
+        </p:sp>
+        <p:sp>
+          <p:nvSpPr>
+            <p:cNvPr id="32" name="矩形 31"/>
+            <p:cNvSpPr/>
+            <p:nvPr/>
+          </p:nvSpPr>
+          <p:spPr>
+            <a:xfrm>
+              <a:off x="7444476" y="1630833"/>
+              <a:ext cx="1084886" cy="316525"/>
+            </a:xfrm>
+            <a:prstGeom prst="rect">
+              <a:avLst/>
+            </a:prstGeom>
+          </p:spPr>
+          <p:style>
+            <a:lnRef idx="2">
+              <a:schemeClr val="accent3">
+                <a:shade val="50000"/>
+              </a:schemeClr>
+            </a:lnRef>
+            <a:fillRef idx="1">
+              <a:schemeClr val="accent3"/>
+            </a:fillRef>
+            <a:effectRef idx="0">
+              <a:schemeClr val="accent3"/>
+            </a:effectRef>
+            <a:fontRef idx="minor">
+              <a:schemeClr val="lt1"/>
+            </a:fontRef>
+          </p:style>
+          <p:txBody>
+            <a:bodyPr rtlCol="0" anchor="ctr"/>
+            <a:lstStyle/>
+            <a:p>
+              <a:pPr algn="ctr"/>
+              <a:r>
+                <a:rPr kumimoji="1" lang="en-US" altLang="zh-CN" dirty="0" smtClean="0"/>
+                <a:t>app</a:t>
+              </a:r>
+              <a:endParaRPr kumimoji="1" lang="zh-CN" altLang="en-US" dirty="0"/>
+            </a:p>
+          </p:txBody>
+        </p:sp>
+      </p:grpSp>
+      <p:sp>
+        <p:nvSpPr>
+          <p:cNvPr id="33" name="上下箭头 32"/>
+          <p:cNvSpPr/>
+          <p:nvPr/>
+        </p:nvSpPr>
+        <p:spPr>
+          <a:xfrm rot="1515431">
+            <a:off x="7546971" y="2365273"/>
+            <a:ext cx="258418" cy="908795"/>
+          </a:xfrm>
+          <a:prstGeom prst="upDownArrow">
+            <a:avLst/>
+          </a:prstGeom>
+        </p:spPr>
+        <p:style>
+          <a:lnRef idx="2">
+            <a:schemeClr val="accent2">
+              <a:shade val="50000"/>
+            </a:schemeClr>
+          </a:lnRef>
+          <a:fillRef idx="1">
+            <a:schemeClr val="accent2"/>
+          </a:fillRef>
+          <a:effectRef idx="0">
+            <a:schemeClr val="accent2"/>
+          </a:effectRef>
+          <a:fontRef idx="minor">
+            <a:schemeClr val="lt1"/>
+          </a:fontRef>
+        </p:style>
+        <p:txBody>
+          <a:bodyPr rtlCol="0" anchor="ctr"/>
+          <a:lstStyle/>
+          <a:p>
+            <a:pPr algn="ctr"/>
+            <a:endParaRPr kumimoji="1" lang="zh-CN" altLang="en-US"/>
+          </a:p>
+        </p:txBody>
+      </p:sp>
+      <p:cxnSp>
+        <p:nvCxnSpPr>
+          <p:cNvPr id="35" name="直线箭头连接符 34"/>
+          <p:cNvCxnSpPr/>
+          <p:nvPr/>
+        </p:nvCxnSpPr>
+        <p:spPr>
+          <a:xfrm>
+            <a:off x="3546800" y="2645020"/>
+            <a:ext cx="1630626" cy="768899"/>
+          </a:xfrm>
+          <a:prstGeom prst="straightConnector1">
+            <a:avLst/>
+          </a:prstGeom>
+          <a:ln>
+            <a:headEnd type="triangle"/>
+            <a:tailEnd type="triangle"/>
+          </a:ln>
+        </p:spPr>
+        <p:style>
+          <a:lnRef idx="3">
+            <a:schemeClr val="accent2"/>
+          </a:lnRef>
+          <a:fillRef idx="0">
+            <a:schemeClr val="accent2"/>
+          </a:fillRef>
+          <a:effectRef idx="2">
+            <a:schemeClr val="accent2"/>
+          </a:effectRef>
+          <a:fontRef idx="minor">
+            <a:schemeClr val="tx1"/>
+          </a:fontRef>
+        </p:style>
+      </p:cxnSp>
+      <p:cxnSp>
+        <p:nvCxnSpPr>
+          <p:cNvPr id="36" name="直线箭头连接符 35"/>
+          <p:cNvCxnSpPr/>
+          <p:nvPr/>
+        </p:nvCxnSpPr>
+        <p:spPr>
+          <a:xfrm flipV="1">
+            <a:off x="4759370" y="2115236"/>
+            <a:ext cx="2606069" cy="14901"/>
+          </a:xfrm>
+          <a:prstGeom prst="straightConnector1">
+            <a:avLst/>
+          </a:prstGeom>
+          <a:ln>
+            <a:headEnd type="triangle"/>
+            <a:tailEnd type="triangle"/>
+          </a:ln>
+        </p:spPr>
+        <p:style>
+          <a:lnRef idx="3">
+            <a:schemeClr val="accent2"/>
+          </a:lnRef>
+          <a:fillRef idx="0">
+            <a:schemeClr val="accent2"/>
+          </a:fillRef>
+          <a:effectRef idx="2">
+            <a:schemeClr val="accent2"/>
+          </a:effectRef>
+          <a:fontRef idx="minor">
+            <a:schemeClr val="tx1"/>
+          </a:fontRef>
+        </p:style>
+      </p:cxnSp>
+    </p:spTree>
+    <p:extLst>
+      <p:ext uri="{BB962C8B-B14F-4D97-AF65-F5344CB8AC3E}">
+        <p14:creationId xmlns:p14="http://schemas.microsoft.com/office/powerpoint/2010/main" val="1410517017"/>
+      </p:ext>
+    </p:extLst>
+  </p:cSld>
+  <p:clrMapOvr>
+    <a:masterClrMapping/>
+  </p:clrMapOvr>
+</p:sld>
+</file>
+
+<file path=ppt/slides/slide3.xml><?xml version="1.0" encoding="utf-8"?>
+<p:sld xmlns:a="http://schemas.openxmlformats.org/drawingml/2006/main" xmlns:r="http://schemas.openxmlformats.org/officeDocument/2006/relationships" xmlns:p="http://schemas.openxmlformats.org/presentationml/2006/main">
+  <p:cSld>
+    <p:spTree>
+      <p:nvGrpSpPr>
+        <p:cNvPr id="1" name=""/>
+        <p:cNvGrpSpPr/>
+        <p:nvPr/>
+      </p:nvGrpSpPr>
+      <p:grpSpPr>
+        <a:xfrm>
+          <a:off x="0" y="0"/>
+          <a:ext cx="0" cy="0"/>
+          <a:chOff x="0" y="0"/>
+          <a:chExt cx="0" cy="0"/>
+        </a:xfrm>
+      </p:grpSpPr>
+      <p:sp>
+        <p:nvSpPr>
           <p:cNvPr id="4" name="椭圆 3"/>
           <p:cNvSpPr/>
           <p:nvPr/>
@@ -3733,7 +5084,7 @@
 </p:sld>
 </file>
 
-<file path=ppt/slides/slide3.xml><?xml version="1.0" encoding="utf-8"?>
+<file path=ppt/slides/slide4.xml><?xml version="1.0" encoding="utf-8"?>
 <p:sld xmlns:a="http://schemas.openxmlformats.org/drawingml/2006/main" xmlns:r="http://schemas.openxmlformats.org/officeDocument/2006/relationships" xmlns:p="http://schemas.openxmlformats.org/presentationml/2006/main">
   <p:cSld>
     <p:spTree>

</xml_diff>

<commit_message>
Design: Update Design Docs
Add Fault Process, OSDMap Change, etc.

Signed-off-by: Dong Yuan <yuandong1222@gmail.com>
</commit_message>
<xml_diff>
--- a/doc/pic.pptx
+++ b/doc/pic.pptx
@@ -10,6 +10,7 @@
     <p:sldId id="257" r:id="rId4"/>
     <p:sldId id="261" r:id="rId5"/>
     <p:sldId id="260" r:id="rId6"/>
+    <p:sldId id="262" r:id="rId7"/>
   </p:sldIdLst>
   <p:sldSz cx="12192000" cy="6858000"/>
   <p:notesSz cx="6858000" cy="9144000"/>
@@ -247,7 +248,7 @@
           <a:p>
             <a:fld id="{0BFDC94F-F344-9C4E-A3D8-927C44D5FDAF}" type="datetimeFigureOut">
               <a:rPr kumimoji="1" lang="zh-CN" altLang="en-US" smtClean="0"/>
-              <a:t>15/12/10</a:t>
+              <a:t>15/12/14</a:t>
             </a:fld>
             <a:endParaRPr kumimoji="1" lang="zh-CN" altLang="en-US"/>
           </a:p>
@@ -417,7 +418,7 @@
           <a:p>
             <a:fld id="{0BFDC94F-F344-9C4E-A3D8-927C44D5FDAF}" type="datetimeFigureOut">
               <a:rPr kumimoji="1" lang="zh-CN" altLang="en-US" smtClean="0"/>
-              <a:t>15/12/10</a:t>
+              <a:t>15/12/14</a:t>
             </a:fld>
             <a:endParaRPr kumimoji="1" lang="zh-CN" altLang="en-US"/>
           </a:p>
@@ -597,7 +598,7 @@
           <a:p>
             <a:fld id="{0BFDC94F-F344-9C4E-A3D8-927C44D5FDAF}" type="datetimeFigureOut">
               <a:rPr kumimoji="1" lang="zh-CN" altLang="en-US" smtClean="0"/>
-              <a:t>15/12/10</a:t>
+              <a:t>15/12/14</a:t>
             </a:fld>
             <a:endParaRPr kumimoji="1" lang="zh-CN" altLang="en-US"/>
           </a:p>
@@ -767,7 +768,7 @@
           <a:p>
             <a:fld id="{0BFDC94F-F344-9C4E-A3D8-927C44D5FDAF}" type="datetimeFigureOut">
               <a:rPr kumimoji="1" lang="zh-CN" altLang="en-US" smtClean="0"/>
-              <a:t>15/12/10</a:t>
+              <a:t>15/12/14</a:t>
             </a:fld>
             <a:endParaRPr kumimoji="1" lang="zh-CN" altLang="en-US"/>
           </a:p>
@@ -1013,7 +1014,7 @@
           <a:p>
             <a:fld id="{0BFDC94F-F344-9C4E-A3D8-927C44D5FDAF}" type="datetimeFigureOut">
               <a:rPr kumimoji="1" lang="zh-CN" altLang="en-US" smtClean="0"/>
-              <a:t>15/12/10</a:t>
+              <a:t>15/12/14</a:t>
             </a:fld>
             <a:endParaRPr kumimoji="1" lang="zh-CN" altLang="en-US"/>
           </a:p>
@@ -1245,7 +1246,7 @@
           <a:p>
             <a:fld id="{0BFDC94F-F344-9C4E-A3D8-927C44D5FDAF}" type="datetimeFigureOut">
               <a:rPr kumimoji="1" lang="zh-CN" altLang="en-US" smtClean="0"/>
-              <a:t>15/12/10</a:t>
+              <a:t>15/12/14</a:t>
             </a:fld>
             <a:endParaRPr kumimoji="1" lang="zh-CN" altLang="en-US"/>
           </a:p>
@@ -1612,7 +1613,7 @@
           <a:p>
             <a:fld id="{0BFDC94F-F344-9C4E-A3D8-927C44D5FDAF}" type="datetimeFigureOut">
               <a:rPr kumimoji="1" lang="zh-CN" altLang="en-US" smtClean="0"/>
-              <a:t>15/12/10</a:t>
+              <a:t>15/12/14</a:t>
             </a:fld>
             <a:endParaRPr kumimoji="1" lang="zh-CN" altLang="en-US"/>
           </a:p>
@@ -1730,7 +1731,7 @@
           <a:p>
             <a:fld id="{0BFDC94F-F344-9C4E-A3D8-927C44D5FDAF}" type="datetimeFigureOut">
               <a:rPr kumimoji="1" lang="zh-CN" altLang="en-US" smtClean="0"/>
-              <a:t>15/12/10</a:t>
+              <a:t>15/12/14</a:t>
             </a:fld>
             <a:endParaRPr kumimoji="1" lang="zh-CN" altLang="en-US"/>
           </a:p>
@@ -1825,7 +1826,7 @@
           <a:p>
             <a:fld id="{0BFDC94F-F344-9C4E-A3D8-927C44D5FDAF}" type="datetimeFigureOut">
               <a:rPr kumimoji="1" lang="zh-CN" altLang="en-US" smtClean="0"/>
-              <a:t>15/12/10</a:t>
+              <a:t>15/12/14</a:t>
             </a:fld>
             <a:endParaRPr kumimoji="1" lang="zh-CN" altLang="en-US"/>
           </a:p>
@@ -2102,7 +2103,7 @@
           <a:p>
             <a:fld id="{0BFDC94F-F344-9C4E-A3D8-927C44D5FDAF}" type="datetimeFigureOut">
               <a:rPr kumimoji="1" lang="zh-CN" altLang="en-US" smtClean="0"/>
-              <a:t>15/12/10</a:t>
+              <a:t>15/12/14</a:t>
             </a:fld>
             <a:endParaRPr kumimoji="1" lang="zh-CN" altLang="en-US"/>
           </a:p>
@@ -2355,7 +2356,7 @@
           <a:p>
             <a:fld id="{0BFDC94F-F344-9C4E-A3D8-927C44D5FDAF}" type="datetimeFigureOut">
               <a:rPr kumimoji="1" lang="zh-CN" altLang="en-US" smtClean="0"/>
-              <a:t>15/12/10</a:t>
+              <a:t>15/12/14</a:t>
             </a:fld>
             <a:endParaRPr kumimoji="1" lang="zh-CN" altLang="en-US"/>
           </a:p>
@@ -2568,7 +2569,7 @@
           <a:p>
             <a:fld id="{0BFDC94F-F344-9C4E-A3D8-927C44D5FDAF}" type="datetimeFigureOut">
               <a:rPr kumimoji="1" lang="zh-CN" altLang="en-US" smtClean="0"/>
-              <a:t>15/12/10</a:t>
+              <a:t>15/12/14</a:t>
             </a:fld>
             <a:endParaRPr kumimoji="1" lang="zh-CN" altLang="en-US"/>
           </a:p>
@@ -5430,11 +5431,7 @@
             </a:r>
             <a:r>
               <a:rPr kumimoji="1" lang="en-US" altLang="zh-CN" dirty="0" smtClean="0"/>
-              <a:t>Step3-</a:t>
-            </a:r>
-            <a:r>
-              <a:rPr kumimoji="1" lang="en-US" altLang="zh-CN" dirty="0" smtClean="0"/>
-              <a:t>Response</a:t>
+              <a:t>Step3-Response</a:t>
             </a:r>
             <a:endParaRPr kumimoji="1" lang="zh-CN" altLang="en-US" dirty="0"/>
           </a:p>
@@ -5951,11 +5948,7 @@
               <a:pPr algn="ctr"/>
               <a:r>
                 <a:rPr kumimoji="1" lang="en-US" altLang="zh-CN" dirty="0" smtClean="0"/>
-                <a:t>S</a:t>
-              </a:r>
-              <a:r>
-                <a:rPr kumimoji="1" lang="en-US" altLang="zh-CN" dirty="0" smtClean="0"/>
-                <a:t>1</a:t>
+                <a:t>S1</a:t>
               </a:r>
               <a:endParaRPr kumimoji="1" lang="zh-CN" altLang="en-US" dirty="0"/>
             </a:p>
@@ -6260,11 +6253,7 @@
               <a:pPr algn="ctr"/>
               <a:r>
                 <a:rPr kumimoji="1" lang="en-US" altLang="zh-CN" dirty="0" smtClean="0"/>
-                <a:t>S</a:t>
-              </a:r>
-              <a:r>
-                <a:rPr kumimoji="1" lang="en-US" altLang="zh-CN" dirty="0" smtClean="0"/>
-                <a:t>2</a:t>
+                <a:t>S2</a:t>
               </a:r>
               <a:endParaRPr kumimoji="1" lang="zh-CN" altLang="en-US" dirty="0"/>
             </a:p>
@@ -7092,6 +7081,291 @@
     <p:extLst>
       <p:ext uri="{BB962C8B-B14F-4D97-AF65-F5344CB8AC3E}">
         <p14:creationId xmlns:p14="http://schemas.microsoft.com/office/powerpoint/2010/main" val="242925146"/>
+      </p:ext>
+    </p:extLst>
+  </p:cSld>
+  <p:clrMapOvr>
+    <a:masterClrMapping/>
+  </p:clrMapOvr>
+</p:sld>
+</file>
+
+<file path=ppt/slides/slide6.xml><?xml version="1.0" encoding="utf-8"?>
+<p:sld xmlns:a="http://schemas.openxmlformats.org/drawingml/2006/main" xmlns:r="http://schemas.openxmlformats.org/officeDocument/2006/relationships" xmlns:p="http://schemas.openxmlformats.org/presentationml/2006/main">
+  <p:cSld>
+    <p:spTree>
+      <p:nvGrpSpPr>
+        <p:cNvPr id="1" name=""/>
+        <p:cNvGrpSpPr/>
+        <p:nvPr/>
+      </p:nvGrpSpPr>
+      <p:grpSpPr>
+        <a:xfrm>
+          <a:off x="0" y="0"/>
+          <a:ext cx="0" cy="0"/>
+          <a:chOff x="0" y="0"/>
+          <a:chExt cx="0" cy="0"/>
+        </a:xfrm>
+      </p:grpSpPr>
+      <p:sp>
+        <p:nvSpPr>
+          <p:cNvPr id="2" name="标题 1"/>
+          <p:cNvSpPr>
+            <a:spLocks noGrp="1"/>
+          </p:cNvSpPr>
+          <p:nvPr>
+            <p:ph type="title"/>
+          </p:nvPr>
+        </p:nvSpPr>
+        <p:spPr/>
+        <p:txBody>
+          <a:bodyPr/>
+          <a:lstStyle/>
+          <a:p>
+            <a:r>
+              <a:rPr kumimoji="1" lang="en-US" altLang="zh-CN" dirty="0" smtClean="0"/>
+              <a:t>PG</a:t>
+            </a:r>
+            <a:r>
+              <a:rPr kumimoji="1" lang="zh-CN" altLang="en-US" dirty="0" smtClean="0"/>
+              <a:t>状态迁移</a:t>
+            </a:r>
+            <a:endParaRPr kumimoji="1" lang="zh-CN" altLang="en-US" dirty="0"/>
+          </a:p>
+        </p:txBody>
+      </p:sp>
+      <p:sp>
+        <p:nvSpPr>
+          <p:cNvPr id="3" name="矩形 2"/>
+          <p:cNvSpPr/>
+          <p:nvPr/>
+        </p:nvSpPr>
+        <p:spPr>
+          <a:xfrm>
+            <a:off x="1778696" y="3068877"/>
+            <a:ext cx="1665962" cy="826718"/>
+          </a:xfrm>
+          <a:prstGeom prst="rect">
+            <a:avLst/>
+          </a:prstGeom>
+        </p:spPr>
+        <p:style>
+          <a:lnRef idx="2">
+            <a:schemeClr val="accent1">
+              <a:shade val="50000"/>
+            </a:schemeClr>
+          </a:lnRef>
+          <a:fillRef idx="1">
+            <a:schemeClr val="accent1"/>
+          </a:fillRef>
+          <a:effectRef idx="0">
+            <a:schemeClr val="accent1"/>
+          </a:effectRef>
+          <a:fontRef idx="minor">
+            <a:schemeClr val="lt1"/>
+          </a:fontRef>
+        </p:style>
+        <p:txBody>
+          <a:bodyPr rtlCol="0" anchor="ctr"/>
+          <a:lstStyle/>
+          <a:p>
+            <a:pPr algn="ctr"/>
+            <a:r>
+              <a:rPr kumimoji="1" lang="en-US" altLang="zh-CN" dirty="0" smtClean="0">
+                <a:latin typeface="Microsoft YaHei" charset="0"/>
+                <a:ea typeface="Microsoft YaHei" charset="0"/>
+                <a:cs typeface="Microsoft YaHei" charset="0"/>
+              </a:rPr>
+              <a:t>Initial</a:t>
+            </a:r>
+            <a:endParaRPr kumimoji="1" lang="zh-CN" altLang="en-US" dirty="0">
+              <a:latin typeface="Microsoft YaHei" charset="0"/>
+              <a:ea typeface="Microsoft YaHei" charset="0"/>
+              <a:cs typeface="Microsoft YaHei" charset="0"/>
+            </a:endParaRPr>
+          </a:p>
+        </p:txBody>
+      </p:sp>
+      <p:sp>
+        <p:nvSpPr>
+          <p:cNvPr id="4" name="矩形 3"/>
+          <p:cNvSpPr/>
+          <p:nvPr/>
+        </p:nvSpPr>
+        <p:spPr>
+          <a:xfrm>
+            <a:off x="4430038" y="3068877"/>
+            <a:ext cx="1665962" cy="826718"/>
+          </a:xfrm>
+          <a:prstGeom prst="rect">
+            <a:avLst/>
+          </a:prstGeom>
+        </p:spPr>
+        <p:style>
+          <a:lnRef idx="2">
+            <a:schemeClr val="accent1">
+              <a:shade val="50000"/>
+            </a:schemeClr>
+          </a:lnRef>
+          <a:fillRef idx="1">
+            <a:schemeClr val="accent1"/>
+          </a:fillRef>
+          <a:effectRef idx="0">
+            <a:schemeClr val="accent1"/>
+          </a:effectRef>
+          <a:fontRef idx="minor">
+            <a:schemeClr val="lt1"/>
+          </a:fontRef>
+        </p:style>
+        <p:txBody>
+          <a:bodyPr rtlCol="0" anchor="ctr"/>
+          <a:lstStyle/>
+          <a:p>
+            <a:pPr algn="ctr"/>
+            <a:r>
+              <a:rPr kumimoji="1" lang="en-US" altLang="zh-CN" dirty="0" smtClean="0">
+                <a:latin typeface="Microsoft YaHei" charset="0"/>
+                <a:ea typeface="Microsoft YaHei" charset="0"/>
+                <a:cs typeface="Microsoft YaHei" charset="0"/>
+              </a:rPr>
+              <a:t>Active</a:t>
+            </a:r>
+            <a:endParaRPr kumimoji="1" lang="zh-CN" altLang="en-US" dirty="0">
+              <a:latin typeface="Microsoft YaHei" charset="0"/>
+              <a:ea typeface="Microsoft YaHei" charset="0"/>
+              <a:cs typeface="Microsoft YaHei" charset="0"/>
+            </a:endParaRPr>
+          </a:p>
+        </p:txBody>
+      </p:sp>
+      <p:sp>
+        <p:nvSpPr>
+          <p:cNvPr id="5" name="矩形 4"/>
+          <p:cNvSpPr/>
+          <p:nvPr/>
+        </p:nvSpPr>
+        <p:spPr>
+          <a:xfrm>
+            <a:off x="7081380" y="3068877"/>
+            <a:ext cx="1665962" cy="826718"/>
+          </a:xfrm>
+          <a:prstGeom prst="rect">
+            <a:avLst/>
+          </a:prstGeom>
+        </p:spPr>
+        <p:style>
+          <a:lnRef idx="2">
+            <a:schemeClr val="accent1">
+              <a:shade val="50000"/>
+            </a:schemeClr>
+          </a:lnRef>
+          <a:fillRef idx="1">
+            <a:schemeClr val="accent1"/>
+          </a:fillRef>
+          <a:effectRef idx="0">
+            <a:schemeClr val="accent1"/>
+          </a:effectRef>
+          <a:fontRef idx="minor">
+            <a:schemeClr val="lt1"/>
+          </a:fontRef>
+        </p:style>
+        <p:txBody>
+          <a:bodyPr rtlCol="0" anchor="ctr"/>
+          <a:lstStyle/>
+          <a:p>
+            <a:pPr algn="ctr"/>
+            <a:r>
+              <a:rPr kumimoji="1" lang="en-US" altLang="zh-CN" dirty="0" smtClean="0">
+                <a:latin typeface="Microsoft YaHei" charset="0"/>
+                <a:ea typeface="Microsoft YaHei" charset="0"/>
+                <a:cs typeface="Microsoft YaHei" charset="0"/>
+              </a:rPr>
+              <a:t>Clean</a:t>
+            </a:r>
+            <a:endParaRPr kumimoji="1" lang="zh-CN" altLang="en-US" dirty="0">
+              <a:latin typeface="Microsoft YaHei" charset="0"/>
+              <a:ea typeface="Microsoft YaHei" charset="0"/>
+              <a:cs typeface="Microsoft YaHei" charset="0"/>
+            </a:endParaRPr>
+          </a:p>
+        </p:txBody>
+      </p:sp>
+      <p:cxnSp>
+        <p:nvCxnSpPr>
+          <p:cNvPr id="9" name="直线箭头连接符 8"/>
+          <p:cNvCxnSpPr>
+            <a:stCxn id="3" idx="3"/>
+            <a:endCxn id="4" idx="1"/>
+          </p:cNvCxnSpPr>
+          <p:nvPr/>
+        </p:nvCxnSpPr>
+        <p:spPr>
+          <a:xfrm>
+            <a:off x="3444658" y="3482236"/>
+            <a:ext cx="985380" cy="0"/>
+          </a:xfrm>
+          <a:prstGeom prst="straightConnector1">
+            <a:avLst/>
+          </a:prstGeom>
+          <a:ln>
+            <a:tailEnd type="triangle"/>
+          </a:ln>
+        </p:spPr>
+        <p:style>
+          <a:lnRef idx="3">
+            <a:schemeClr val="accent1"/>
+          </a:lnRef>
+          <a:fillRef idx="0">
+            <a:schemeClr val="accent1"/>
+          </a:fillRef>
+          <a:effectRef idx="2">
+            <a:schemeClr val="accent1"/>
+          </a:effectRef>
+          <a:fontRef idx="minor">
+            <a:schemeClr val="tx1"/>
+          </a:fontRef>
+        </p:style>
+      </p:cxnSp>
+      <p:cxnSp>
+        <p:nvCxnSpPr>
+          <p:cNvPr id="11" name="直线箭头连接符 10"/>
+          <p:cNvCxnSpPr>
+            <a:stCxn id="4" idx="3"/>
+            <a:endCxn id="5" idx="1"/>
+          </p:cNvCxnSpPr>
+          <p:nvPr/>
+        </p:nvCxnSpPr>
+        <p:spPr>
+          <a:xfrm>
+            <a:off x="6096000" y="3482236"/>
+            <a:ext cx="985380" cy="0"/>
+          </a:xfrm>
+          <a:prstGeom prst="straightConnector1">
+            <a:avLst/>
+          </a:prstGeom>
+          <a:ln>
+            <a:tailEnd type="triangle"/>
+          </a:ln>
+        </p:spPr>
+        <p:style>
+          <a:lnRef idx="3">
+            <a:schemeClr val="accent1"/>
+          </a:lnRef>
+          <a:fillRef idx="0">
+            <a:schemeClr val="accent1"/>
+          </a:fillRef>
+          <a:effectRef idx="2">
+            <a:schemeClr val="accent1"/>
+          </a:effectRef>
+          <a:fontRef idx="minor">
+            <a:schemeClr val="tx1"/>
+          </a:fontRef>
+        </p:style>
+      </p:cxnSp>
+    </p:spTree>
+    <p:extLst>
+      <p:ext uri="{BB962C8B-B14F-4D97-AF65-F5344CB8AC3E}">
+        <p14:creationId xmlns:p14="http://schemas.microsoft.com/office/powerpoint/2010/main" val="84321738"/>
       </p:ext>
     </p:extLst>
   </p:cSld>

</xml_diff>

<commit_message>
Design: Finish Desgin Doc V1
1) Finish Fault Process
2) Finish Cluster Change Analysis

Signed-off-by: Dong Yuan <yuandong1222@gmail.com>
</commit_message>
<xml_diff>
--- a/doc/pic.pptx
+++ b/doc/pic.pptx
@@ -248,7 +248,7 @@
           <a:p>
             <a:fld id="{0BFDC94F-F344-9C4E-A3D8-927C44D5FDAF}" type="datetimeFigureOut">
               <a:rPr kumimoji="1" lang="zh-CN" altLang="en-US" smtClean="0"/>
-              <a:t>15/12/14</a:t>
+              <a:t>15/12/15</a:t>
             </a:fld>
             <a:endParaRPr kumimoji="1" lang="zh-CN" altLang="en-US"/>
           </a:p>
@@ -418,7 +418,7 @@
           <a:p>
             <a:fld id="{0BFDC94F-F344-9C4E-A3D8-927C44D5FDAF}" type="datetimeFigureOut">
               <a:rPr kumimoji="1" lang="zh-CN" altLang="en-US" smtClean="0"/>
-              <a:t>15/12/14</a:t>
+              <a:t>15/12/15</a:t>
             </a:fld>
             <a:endParaRPr kumimoji="1" lang="zh-CN" altLang="en-US"/>
           </a:p>
@@ -598,7 +598,7 @@
           <a:p>
             <a:fld id="{0BFDC94F-F344-9C4E-A3D8-927C44D5FDAF}" type="datetimeFigureOut">
               <a:rPr kumimoji="1" lang="zh-CN" altLang="en-US" smtClean="0"/>
-              <a:t>15/12/14</a:t>
+              <a:t>15/12/15</a:t>
             </a:fld>
             <a:endParaRPr kumimoji="1" lang="zh-CN" altLang="en-US"/>
           </a:p>
@@ -768,7 +768,7 @@
           <a:p>
             <a:fld id="{0BFDC94F-F344-9C4E-A3D8-927C44D5FDAF}" type="datetimeFigureOut">
               <a:rPr kumimoji="1" lang="zh-CN" altLang="en-US" smtClean="0"/>
-              <a:t>15/12/14</a:t>
+              <a:t>15/12/15</a:t>
             </a:fld>
             <a:endParaRPr kumimoji="1" lang="zh-CN" altLang="en-US"/>
           </a:p>
@@ -1014,7 +1014,7 @@
           <a:p>
             <a:fld id="{0BFDC94F-F344-9C4E-A3D8-927C44D5FDAF}" type="datetimeFigureOut">
               <a:rPr kumimoji="1" lang="zh-CN" altLang="en-US" smtClean="0"/>
-              <a:t>15/12/14</a:t>
+              <a:t>15/12/15</a:t>
             </a:fld>
             <a:endParaRPr kumimoji="1" lang="zh-CN" altLang="en-US"/>
           </a:p>
@@ -1246,7 +1246,7 @@
           <a:p>
             <a:fld id="{0BFDC94F-F344-9C4E-A3D8-927C44D5FDAF}" type="datetimeFigureOut">
               <a:rPr kumimoji="1" lang="zh-CN" altLang="en-US" smtClean="0"/>
-              <a:t>15/12/14</a:t>
+              <a:t>15/12/15</a:t>
             </a:fld>
             <a:endParaRPr kumimoji="1" lang="zh-CN" altLang="en-US"/>
           </a:p>
@@ -1613,7 +1613,7 @@
           <a:p>
             <a:fld id="{0BFDC94F-F344-9C4E-A3D8-927C44D5FDAF}" type="datetimeFigureOut">
               <a:rPr kumimoji="1" lang="zh-CN" altLang="en-US" smtClean="0"/>
-              <a:t>15/12/14</a:t>
+              <a:t>15/12/15</a:t>
             </a:fld>
             <a:endParaRPr kumimoji="1" lang="zh-CN" altLang="en-US"/>
           </a:p>
@@ -1731,7 +1731,7 @@
           <a:p>
             <a:fld id="{0BFDC94F-F344-9C4E-A3D8-927C44D5FDAF}" type="datetimeFigureOut">
               <a:rPr kumimoji="1" lang="zh-CN" altLang="en-US" smtClean="0"/>
-              <a:t>15/12/14</a:t>
+              <a:t>15/12/15</a:t>
             </a:fld>
             <a:endParaRPr kumimoji="1" lang="zh-CN" altLang="en-US"/>
           </a:p>
@@ -1826,7 +1826,7 @@
           <a:p>
             <a:fld id="{0BFDC94F-F344-9C4E-A3D8-927C44D5FDAF}" type="datetimeFigureOut">
               <a:rPr kumimoji="1" lang="zh-CN" altLang="en-US" smtClean="0"/>
-              <a:t>15/12/14</a:t>
+              <a:t>15/12/15</a:t>
             </a:fld>
             <a:endParaRPr kumimoji="1" lang="zh-CN" altLang="en-US"/>
           </a:p>
@@ -2103,7 +2103,7 @@
           <a:p>
             <a:fld id="{0BFDC94F-F344-9C4E-A3D8-927C44D5FDAF}" type="datetimeFigureOut">
               <a:rPr kumimoji="1" lang="zh-CN" altLang="en-US" smtClean="0"/>
-              <a:t>15/12/14</a:t>
+              <a:t>15/12/15</a:t>
             </a:fld>
             <a:endParaRPr kumimoji="1" lang="zh-CN" altLang="en-US"/>
           </a:p>
@@ -2356,7 +2356,7 @@
           <a:p>
             <a:fld id="{0BFDC94F-F344-9C4E-A3D8-927C44D5FDAF}" type="datetimeFigureOut">
               <a:rPr kumimoji="1" lang="zh-CN" altLang="en-US" smtClean="0"/>
-              <a:t>15/12/14</a:t>
+              <a:t>15/12/15</a:t>
             </a:fld>
             <a:endParaRPr kumimoji="1" lang="zh-CN" altLang="en-US"/>
           </a:p>
@@ -2569,7 +2569,7 @@
           <a:p>
             <a:fld id="{0BFDC94F-F344-9C4E-A3D8-927C44D5FDAF}" type="datetimeFigureOut">
               <a:rPr kumimoji="1" lang="zh-CN" altLang="en-US" smtClean="0"/>
-              <a:t>15/12/14</a:t>
+              <a:t>15/12/15</a:t>
             </a:fld>
             <a:endParaRPr kumimoji="1" lang="zh-CN" altLang="en-US"/>
           </a:p>
@@ -6619,32 +6619,8 @@
                 <a:t>Vote</a:t>
               </a:r>
               <a:r>
-                <a:rPr kumimoji="1" lang="zh-CN" altLang="en-US" dirty="0" smtClean="0"/>
+                <a:rPr kumimoji="1" lang="zh-CN" altLang="en-US" smtClean="0"/>
                 <a:t>消息</a:t>
-              </a:r>
-              <a:r>
-                <a:rPr kumimoji="1" lang="en-US" altLang="zh-CN" dirty="0" smtClean="0"/>
-                <a:t>/</a:t>
-              </a:r>
-              <a:r>
-                <a:rPr kumimoji="1" lang="zh-CN" altLang="en-US" dirty="0" smtClean="0"/>
-                <a:t>收到足够</a:t>
-              </a:r>
-              <a:r>
-                <a:rPr kumimoji="1" lang="en-US" altLang="zh-CN" dirty="0" smtClean="0"/>
-                <a:t>Vote</a:t>
-              </a:r>
-              <a:r>
-                <a:rPr kumimoji="1" lang="zh-CN" altLang="en-US" dirty="0" smtClean="0"/>
-                <a:t>消息但并成功写入</a:t>
-              </a:r>
-              <a:r>
-                <a:rPr kumimoji="1" lang="en-US" altLang="zh-CN" dirty="0" smtClean="0"/>
-                <a:t>Commit</a:t>
-              </a:r>
-              <a:r>
-                <a:rPr kumimoji="1" lang="zh-CN" altLang="en-US" dirty="0" smtClean="0"/>
-                <a:t>日志</a:t>
               </a:r>
               <a:endParaRPr kumimoji="1" lang="zh-CN" altLang="en-US" dirty="0"/>
             </a:p>

</xml_diff>

<commit_message>
Doc: Update <<CCeph PG状态.docx>>
Signed-off-by: Dong Yuan <yuandong1222@gmail.com>
</commit_message>
<xml_diff>
--- a/doc/pic.pptx
+++ b/doc/pic.pptx
@@ -11,6 +11,7 @@
     <p:sldId id="261" r:id="rId5"/>
     <p:sldId id="260" r:id="rId6"/>
     <p:sldId id="262" r:id="rId7"/>
+    <p:sldId id="263" r:id="rId8"/>
   </p:sldIdLst>
   <p:sldSz cx="12192000" cy="6858000"/>
   <p:notesSz cx="6858000" cy="9144000"/>
@@ -248,7 +249,7 @@
           <a:p>
             <a:fld id="{0BFDC94F-F344-9C4E-A3D8-927C44D5FDAF}" type="datetimeFigureOut">
               <a:rPr kumimoji="1" lang="zh-CN" altLang="en-US" smtClean="0"/>
-              <a:t>15/12/15</a:t>
+              <a:t>16/8/12</a:t>
             </a:fld>
             <a:endParaRPr kumimoji="1" lang="zh-CN" altLang="en-US"/>
           </a:p>
@@ -418,7 +419,7 @@
           <a:p>
             <a:fld id="{0BFDC94F-F344-9C4E-A3D8-927C44D5FDAF}" type="datetimeFigureOut">
               <a:rPr kumimoji="1" lang="zh-CN" altLang="en-US" smtClean="0"/>
-              <a:t>15/12/15</a:t>
+              <a:t>16/8/12</a:t>
             </a:fld>
             <a:endParaRPr kumimoji="1" lang="zh-CN" altLang="en-US"/>
           </a:p>
@@ -598,7 +599,7 @@
           <a:p>
             <a:fld id="{0BFDC94F-F344-9C4E-A3D8-927C44D5FDAF}" type="datetimeFigureOut">
               <a:rPr kumimoji="1" lang="zh-CN" altLang="en-US" smtClean="0"/>
-              <a:t>15/12/15</a:t>
+              <a:t>16/8/12</a:t>
             </a:fld>
             <a:endParaRPr kumimoji="1" lang="zh-CN" altLang="en-US"/>
           </a:p>
@@ -768,7 +769,7 @@
           <a:p>
             <a:fld id="{0BFDC94F-F344-9C4E-A3D8-927C44D5FDAF}" type="datetimeFigureOut">
               <a:rPr kumimoji="1" lang="zh-CN" altLang="en-US" smtClean="0"/>
-              <a:t>15/12/15</a:t>
+              <a:t>16/8/12</a:t>
             </a:fld>
             <a:endParaRPr kumimoji="1" lang="zh-CN" altLang="en-US"/>
           </a:p>
@@ -1014,7 +1015,7 @@
           <a:p>
             <a:fld id="{0BFDC94F-F344-9C4E-A3D8-927C44D5FDAF}" type="datetimeFigureOut">
               <a:rPr kumimoji="1" lang="zh-CN" altLang="en-US" smtClean="0"/>
-              <a:t>15/12/15</a:t>
+              <a:t>16/8/12</a:t>
             </a:fld>
             <a:endParaRPr kumimoji="1" lang="zh-CN" altLang="en-US"/>
           </a:p>
@@ -1246,7 +1247,7 @@
           <a:p>
             <a:fld id="{0BFDC94F-F344-9C4E-A3D8-927C44D5FDAF}" type="datetimeFigureOut">
               <a:rPr kumimoji="1" lang="zh-CN" altLang="en-US" smtClean="0"/>
-              <a:t>15/12/15</a:t>
+              <a:t>16/8/12</a:t>
             </a:fld>
             <a:endParaRPr kumimoji="1" lang="zh-CN" altLang="en-US"/>
           </a:p>
@@ -1613,7 +1614,7 @@
           <a:p>
             <a:fld id="{0BFDC94F-F344-9C4E-A3D8-927C44D5FDAF}" type="datetimeFigureOut">
               <a:rPr kumimoji="1" lang="zh-CN" altLang="en-US" smtClean="0"/>
-              <a:t>15/12/15</a:t>
+              <a:t>16/8/12</a:t>
             </a:fld>
             <a:endParaRPr kumimoji="1" lang="zh-CN" altLang="en-US"/>
           </a:p>
@@ -1731,7 +1732,7 @@
           <a:p>
             <a:fld id="{0BFDC94F-F344-9C4E-A3D8-927C44D5FDAF}" type="datetimeFigureOut">
               <a:rPr kumimoji="1" lang="zh-CN" altLang="en-US" smtClean="0"/>
-              <a:t>15/12/15</a:t>
+              <a:t>16/8/12</a:t>
             </a:fld>
             <a:endParaRPr kumimoji="1" lang="zh-CN" altLang="en-US"/>
           </a:p>
@@ -1826,7 +1827,7 @@
           <a:p>
             <a:fld id="{0BFDC94F-F344-9C4E-A3D8-927C44D5FDAF}" type="datetimeFigureOut">
               <a:rPr kumimoji="1" lang="zh-CN" altLang="en-US" smtClean="0"/>
-              <a:t>15/12/15</a:t>
+              <a:t>16/8/12</a:t>
             </a:fld>
             <a:endParaRPr kumimoji="1" lang="zh-CN" altLang="en-US"/>
           </a:p>
@@ -2103,7 +2104,7 @@
           <a:p>
             <a:fld id="{0BFDC94F-F344-9C4E-A3D8-927C44D5FDAF}" type="datetimeFigureOut">
               <a:rPr kumimoji="1" lang="zh-CN" altLang="en-US" smtClean="0"/>
-              <a:t>15/12/15</a:t>
+              <a:t>16/8/12</a:t>
             </a:fld>
             <a:endParaRPr kumimoji="1" lang="zh-CN" altLang="en-US"/>
           </a:p>
@@ -2356,7 +2357,7 @@
           <a:p>
             <a:fld id="{0BFDC94F-F344-9C4E-A3D8-927C44D5FDAF}" type="datetimeFigureOut">
               <a:rPr kumimoji="1" lang="zh-CN" altLang="en-US" smtClean="0"/>
-              <a:t>15/12/15</a:t>
+              <a:t>16/8/12</a:t>
             </a:fld>
             <a:endParaRPr kumimoji="1" lang="zh-CN" altLang="en-US"/>
           </a:p>
@@ -2569,7 +2570,7 @@
           <a:p>
             <a:fld id="{0BFDC94F-F344-9C4E-A3D8-927C44D5FDAF}" type="datetimeFigureOut">
               <a:rPr kumimoji="1" lang="zh-CN" altLang="en-US" smtClean="0"/>
-              <a:t>15/12/15</a:t>
+              <a:t>16/8/12</a:t>
             </a:fld>
             <a:endParaRPr kumimoji="1" lang="zh-CN" altLang="en-US"/>
           </a:p>
@@ -7351,6 +7352,535 @@
 </p:sld>
 </file>
 
+<file path=ppt/slides/slide7.xml><?xml version="1.0" encoding="utf-8"?>
+<p:sld xmlns:a="http://schemas.openxmlformats.org/drawingml/2006/main" xmlns:r="http://schemas.openxmlformats.org/officeDocument/2006/relationships" xmlns:p="http://schemas.openxmlformats.org/presentationml/2006/main">
+  <p:cSld>
+    <p:spTree>
+      <p:nvGrpSpPr>
+        <p:cNvPr id="1" name=""/>
+        <p:cNvGrpSpPr/>
+        <p:nvPr/>
+      </p:nvGrpSpPr>
+      <p:grpSpPr>
+        <a:xfrm>
+          <a:off x="0" y="0"/>
+          <a:ext cx="0" cy="0"/>
+          <a:chOff x="0" y="0"/>
+          <a:chExt cx="0" cy="0"/>
+        </a:xfrm>
+      </p:grpSpPr>
+      <p:sp>
+        <p:nvSpPr>
+          <p:cNvPr id="2" name="Title 1"/>
+          <p:cNvSpPr>
+            <a:spLocks noGrp="1"/>
+          </p:cNvSpPr>
+          <p:nvPr>
+            <p:ph type="title"/>
+          </p:nvPr>
+        </p:nvSpPr>
+        <p:spPr/>
+        <p:txBody>
+          <a:bodyPr/>
+          <a:lstStyle/>
+          <a:p>
+            <a:r>
+              <a:rPr lang="en-US" altLang="zh-CN" dirty="0" smtClean="0"/>
+              <a:t>PG</a:t>
+            </a:r>
+            <a:r>
+              <a:rPr lang="zh-CN" altLang="en-US" dirty="0" smtClean="0"/>
+              <a:t>状态转换</a:t>
+            </a:r>
+            <a:endParaRPr lang="en-US" dirty="0"/>
+          </a:p>
+        </p:txBody>
+      </p:sp>
+      <p:sp>
+        <p:nvSpPr>
+          <p:cNvPr id="3" name="Rectangle 2"/>
+          <p:cNvSpPr/>
+          <p:nvPr/>
+        </p:nvSpPr>
+        <p:spPr>
+          <a:xfrm>
+            <a:off x="513568" y="3444658"/>
+            <a:ext cx="1778696" cy="801665"/>
+          </a:xfrm>
+          <a:prstGeom prst="rect">
+            <a:avLst/>
+          </a:prstGeom>
+        </p:spPr>
+        <p:style>
+          <a:lnRef idx="0">
+            <a:schemeClr val="accent1"/>
+          </a:lnRef>
+          <a:fillRef idx="3">
+            <a:schemeClr val="accent1"/>
+          </a:fillRef>
+          <a:effectRef idx="3">
+            <a:schemeClr val="accent1"/>
+          </a:effectRef>
+          <a:fontRef idx="minor">
+            <a:schemeClr val="lt1"/>
+          </a:fontRef>
+        </p:style>
+        <p:txBody>
+          <a:bodyPr rtlCol="0" anchor="ctr"/>
+          <a:lstStyle/>
+          <a:p>
+            <a:pPr algn="ctr"/>
+            <a:r>
+              <a:rPr lang="en-US" altLang="zh-CN" sz="2400" smtClean="0"/>
+              <a:t>Initial</a:t>
+            </a:r>
+            <a:endParaRPr lang="en-US" sz="2400"/>
+          </a:p>
+        </p:txBody>
+      </p:sp>
+      <p:sp>
+        <p:nvSpPr>
+          <p:cNvPr id="4" name="Rectangle 3"/>
+          <p:cNvSpPr/>
+          <p:nvPr/>
+        </p:nvSpPr>
+        <p:spPr>
+          <a:xfrm>
+            <a:off x="2870548" y="3444658"/>
+            <a:ext cx="1778696" cy="801665"/>
+          </a:xfrm>
+          <a:prstGeom prst="rect">
+            <a:avLst/>
+          </a:prstGeom>
+        </p:spPr>
+        <p:style>
+          <a:lnRef idx="0">
+            <a:schemeClr val="accent5"/>
+          </a:lnRef>
+          <a:fillRef idx="3">
+            <a:schemeClr val="accent5"/>
+          </a:fillRef>
+          <a:effectRef idx="3">
+            <a:schemeClr val="accent5"/>
+          </a:effectRef>
+          <a:fontRef idx="minor">
+            <a:schemeClr val="lt1"/>
+          </a:fontRef>
+        </p:style>
+        <p:txBody>
+          <a:bodyPr rtlCol="0" anchor="ctr"/>
+          <a:lstStyle/>
+          <a:p>
+            <a:pPr algn="ctr"/>
+            <a:r>
+              <a:rPr lang="en-US" altLang="zh-CN" sz="2400" dirty="0" smtClean="0"/>
+              <a:t>Starting</a:t>
+            </a:r>
+            <a:endParaRPr lang="en-US" sz="2400" dirty="0"/>
+          </a:p>
+        </p:txBody>
+      </p:sp>
+      <p:sp>
+        <p:nvSpPr>
+          <p:cNvPr id="5" name="Rectangle 4"/>
+          <p:cNvSpPr/>
+          <p:nvPr/>
+        </p:nvSpPr>
+        <p:spPr>
+          <a:xfrm>
+            <a:off x="6066772" y="2028891"/>
+            <a:ext cx="1778696" cy="801665"/>
+          </a:xfrm>
+          <a:prstGeom prst="rect">
+            <a:avLst/>
+          </a:prstGeom>
+        </p:spPr>
+        <p:style>
+          <a:lnRef idx="0">
+            <a:schemeClr val="accent6"/>
+          </a:lnRef>
+          <a:fillRef idx="3">
+            <a:schemeClr val="accent6"/>
+          </a:fillRef>
+          <a:effectRef idx="3">
+            <a:schemeClr val="accent6"/>
+          </a:effectRef>
+          <a:fontRef idx="minor">
+            <a:schemeClr val="lt1"/>
+          </a:fontRef>
+        </p:style>
+        <p:txBody>
+          <a:bodyPr rtlCol="0" anchor="ctr"/>
+          <a:lstStyle/>
+          <a:p>
+            <a:pPr algn="ctr"/>
+            <a:r>
+              <a:rPr lang="en-US" altLang="zh-CN" sz="2400" smtClean="0"/>
+              <a:t>Active</a:t>
+            </a:r>
+            <a:endParaRPr lang="en-US" sz="2400" dirty="0"/>
+          </a:p>
+        </p:txBody>
+      </p:sp>
+      <p:cxnSp>
+        <p:nvCxnSpPr>
+          <p:cNvPr id="8" name="Straight Arrow Connector 7"/>
+          <p:cNvCxnSpPr>
+            <a:stCxn id="3" idx="3"/>
+            <a:endCxn id="4" idx="1"/>
+          </p:cNvCxnSpPr>
+          <p:nvPr/>
+        </p:nvCxnSpPr>
+        <p:spPr>
+          <a:xfrm>
+            <a:off x="2292264" y="3845491"/>
+            <a:ext cx="578284" cy="0"/>
+          </a:xfrm>
+          <a:prstGeom prst="straightConnector1">
+            <a:avLst/>
+          </a:prstGeom>
+          <a:ln>
+            <a:tailEnd type="triangle"/>
+          </a:ln>
+        </p:spPr>
+        <p:style>
+          <a:lnRef idx="3">
+            <a:schemeClr val="accent1"/>
+          </a:lnRef>
+          <a:fillRef idx="0">
+            <a:schemeClr val="accent1"/>
+          </a:fillRef>
+          <a:effectRef idx="2">
+            <a:schemeClr val="accent1"/>
+          </a:effectRef>
+          <a:fontRef idx="minor">
+            <a:schemeClr val="tx1"/>
+          </a:fontRef>
+        </p:style>
+      </p:cxnSp>
+      <p:cxnSp>
+        <p:nvCxnSpPr>
+          <p:cNvPr id="12" name="Elbow Connector 11"/>
+          <p:cNvCxnSpPr>
+            <a:stCxn id="4" idx="3"/>
+            <a:endCxn id="5" idx="1"/>
+          </p:cNvCxnSpPr>
+          <p:nvPr/>
+        </p:nvCxnSpPr>
+        <p:spPr>
+          <a:xfrm flipV="1">
+            <a:off x="4649244" y="2429724"/>
+            <a:ext cx="1417528" cy="1415767"/>
+          </a:xfrm>
+          <a:prstGeom prst="bentConnector3">
+            <a:avLst/>
+          </a:prstGeom>
+          <a:ln>
+            <a:tailEnd type="triangle"/>
+          </a:ln>
+        </p:spPr>
+        <p:style>
+          <a:lnRef idx="3">
+            <a:schemeClr val="accent1"/>
+          </a:lnRef>
+          <a:fillRef idx="0">
+            <a:schemeClr val="accent1"/>
+          </a:fillRef>
+          <a:effectRef idx="2">
+            <a:schemeClr val="accent1"/>
+          </a:effectRef>
+          <a:fontRef idx="minor">
+            <a:schemeClr val="tx1"/>
+          </a:fontRef>
+        </p:style>
+      </p:cxnSp>
+      <p:sp>
+        <p:nvSpPr>
+          <p:cNvPr id="13" name="Rectangle 12"/>
+          <p:cNvSpPr/>
+          <p:nvPr/>
+        </p:nvSpPr>
+        <p:spPr>
+          <a:xfrm>
+            <a:off x="6066772" y="3444658"/>
+            <a:ext cx="1778696" cy="801665"/>
+          </a:xfrm>
+          <a:prstGeom prst="rect">
+            <a:avLst/>
+          </a:prstGeom>
+        </p:spPr>
+        <p:style>
+          <a:lnRef idx="0">
+            <a:schemeClr val="accent3"/>
+          </a:lnRef>
+          <a:fillRef idx="3">
+            <a:schemeClr val="accent3"/>
+          </a:fillRef>
+          <a:effectRef idx="3">
+            <a:schemeClr val="accent3"/>
+          </a:effectRef>
+          <a:fontRef idx="minor">
+            <a:schemeClr val="lt1"/>
+          </a:fontRef>
+        </p:style>
+        <p:txBody>
+          <a:bodyPr rtlCol="0" anchor="ctr"/>
+          <a:lstStyle/>
+          <a:p>
+            <a:pPr algn="ctr"/>
+            <a:r>
+              <a:rPr lang="en-US" altLang="zh-CN" sz="2400" smtClean="0"/>
+              <a:t>Disuse</a:t>
+            </a:r>
+            <a:endParaRPr lang="en-US" sz="2400" dirty="0"/>
+          </a:p>
+        </p:txBody>
+      </p:sp>
+      <p:sp>
+        <p:nvSpPr>
+          <p:cNvPr id="14" name="Rectangle 13"/>
+          <p:cNvSpPr/>
+          <p:nvPr/>
+        </p:nvSpPr>
+        <p:spPr>
+          <a:xfrm>
+            <a:off x="6066772" y="4810648"/>
+            <a:ext cx="1778696" cy="801665"/>
+          </a:xfrm>
+          <a:prstGeom prst="rect">
+            <a:avLst/>
+          </a:prstGeom>
+        </p:spPr>
+        <p:style>
+          <a:lnRef idx="0">
+            <a:schemeClr val="accent2"/>
+          </a:lnRef>
+          <a:fillRef idx="3">
+            <a:schemeClr val="accent2"/>
+          </a:fillRef>
+          <a:effectRef idx="3">
+            <a:schemeClr val="accent2"/>
+          </a:effectRef>
+          <a:fontRef idx="minor">
+            <a:schemeClr val="lt1"/>
+          </a:fontRef>
+        </p:style>
+        <p:txBody>
+          <a:bodyPr rtlCol="0" anchor="ctr"/>
+          <a:lstStyle/>
+          <a:p>
+            <a:pPr algn="ctr"/>
+            <a:r>
+              <a:rPr lang="en-US" altLang="zh-CN" sz="2400" dirty="0" err="1" smtClean="0"/>
+              <a:t>InComplete</a:t>
+            </a:r>
+            <a:endParaRPr lang="en-US" sz="2400" dirty="0"/>
+          </a:p>
+        </p:txBody>
+      </p:sp>
+      <p:cxnSp>
+        <p:nvCxnSpPr>
+          <p:cNvPr id="16" name="Straight Arrow Connector 15"/>
+          <p:cNvCxnSpPr>
+            <a:stCxn id="4" idx="3"/>
+            <a:endCxn id="13" idx="1"/>
+          </p:cNvCxnSpPr>
+          <p:nvPr/>
+        </p:nvCxnSpPr>
+        <p:spPr>
+          <a:xfrm>
+            <a:off x="4649244" y="3845491"/>
+            <a:ext cx="1417528" cy="0"/>
+          </a:xfrm>
+          <a:prstGeom prst="straightConnector1">
+            <a:avLst/>
+          </a:prstGeom>
+          <a:ln>
+            <a:tailEnd type="triangle"/>
+          </a:ln>
+        </p:spPr>
+        <p:style>
+          <a:lnRef idx="3">
+            <a:schemeClr val="accent1"/>
+          </a:lnRef>
+          <a:fillRef idx="0">
+            <a:schemeClr val="accent1"/>
+          </a:fillRef>
+          <a:effectRef idx="2">
+            <a:schemeClr val="accent1"/>
+          </a:effectRef>
+          <a:fontRef idx="minor">
+            <a:schemeClr val="tx1"/>
+          </a:fontRef>
+        </p:style>
+      </p:cxnSp>
+      <p:cxnSp>
+        <p:nvCxnSpPr>
+          <p:cNvPr id="19" name="Elbow Connector 18"/>
+          <p:cNvCxnSpPr>
+            <a:stCxn id="4" idx="3"/>
+            <a:endCxn id="14" idx="1"/>
+          </p:cNvCxnSpPr>
+          <p:nvPr/>
+        </p:nvCxnSpPr>
+        <p:spPr>
+          <a:xfrm>
+            <a:off x="4649244" y="3845491"/>
+            <a:ext cx="1417528" cy="1365990"/>
+          </a:xfrm>
+          <a:prstGeom prst="bentConnector3">
+            <a:avLst/>
+          </a:prstGeom>
+          <a:ln>
+            <a:tailEnd type="triangle"/>
+          </a:ln>
+        </p:spPr>
+        <p:style>
+          <a:lnRef idx="3">
+            <a:schemeClr val="accent1"/>
+          </a:lnRef>
+          <a:fillRef idx="0">
+            <a:schemeClr val="accent1"/>
+          </a:fillRef>
+          <a:effectRef idx="2">
+            <a:schemeClr val="accent1"/>
+          </a:effectRef>
+          <a:fontRef idx="minor">
+            <a:schemeClr val="tx1"/>
+          </a:fontRef>
+        </p:style>
+      </p:cxnSp>
+      <p:sp>
+        <p:nvSpPr>
+          <p:cNvPr id="20" name="TextBox 19"/>
+          <p:cNvSpPr txBox="1"/>
+          <p:nvPr/>
+        </p:nvSpPr>
+        <p:spPr>
+          <a:xfrm>
+            <a:off x="8054237" y="2204581"/>
+            <a:ext cx="2848627" cy="369332"/>
+          </a:xfrm>
+          <a:prstGeom prst="rect">
+            <a:avLst/>
+          </a:prstGeom>
+          <a:noFill/>
+        </p:spPr>
+        <p:txBody>
+          <a:bodyPr wrap="square" rtlCol="0">
+            <a:spAutoFit/>
+          </a:bodyPr>
+          <a:lstStyle/>
+          <a:p>
+            <a:r>
+              <a:rPr lang="en-US" altLang="zh-CN" dirty="0" smtClean="0"/>
+              <a:t>PG</a:t>
+            </a:r>
+            <a:r>
+              <a:rPr lang="zh-CN" altLang="en-US" dirty="0" smtClean="0"/>
+              <a:t>启动成功，数据完整</a:t>
+            </a:r>
+            <a:endParaRPr lang="en-US" dirty="0"/>
+          </a:p>
+        </p:txBody>
+      </p:sp>
+      <p:sp>
+        <p:nvSpPr>
+          <p:cNvPr id="21" name="TextBox 20"/>
+          <p:cNvSpPr txBox="1"/>
+          <p:nvPr/>
+        </p:nvSpPr>
+        <p:spPr>
+          <a:xfrm>
+            <a:off x="8054237" y="3660824"/>
+            <a:ext cx="3519813" cy="369332"/>
+          </a:xfrm>
+          <a:prstGeom prst="rect">
+            <a:avLst/>
+          </a:prstGeom>
+          <a:noFill/>
+        </p:spPr>
+        <p:txBody>
+          <a:bodyPr wrap="square" rtlCol="0">
+            <a:spAutoFit/>
+          </a:bodyPr>
+          <a:lstStyle/>
+          <a:p>
+            <a:r>
+              <a:rPr lang="en-US" altLang="zh-CN" dirty="0" smtClean="0"/>
+              <a:t>PG</a:t>
+            </a:r>
+            <a:r>
+              <a:rPr lang="zh-CN" altLang="en-US" dirty="0" smtClean="0"/>
+              <a:t>在该轮</a:t>
+            </a:r>
+            <a:r>
+              <a:rPr lang="en-US" altLang="zh-CN" dirty="0" err="1" smtClean="0"/>
+              <a:t>OSDMap</a:t>
+            </a:r>
+            <a:r>
+              <a:rPr lang="zh-CN" altLang="en-US" dirty="0" smtClean="0"/>
+              <a:t>中不参与请求</a:t>
+            </a:r>
+            <a:endParaRPr lang="en-US" dirty="0"/>
+          </a:p>
+        </p:txBody>
+      </p:sp>
+      <p:sp>
+        <p:nvSpPr>
+          <p:cNvPr id="22" name="TextBox 21"/>
+          <p:cNvSpPr txBox="1"/>
+          <p:nvPr/>
+        </p:nvSpPr>
+        <p:spPr>
+          <a:xfrm>
+            <a:off x="8054237" y="5026814"/>
+            <a:ext cx="3519813" cy="369332"/>
+          </a:xfrm>
+          <a:prstGeom prst="rect">
+            <a:avLst/>
+          </a:prstGeom>
+          <a:noFill/>
+        </p:spPr>
+        <p:txBody>
+          <a:bodyPr wrap="square" rtlCol="0">
+            <a:spAutoFit/>
+          </a:bodyPr>
+          <a:lstStyle/>
+          <a:p>
+            <a:r>
+              <a:rPr lang="en-US" altLang="zh-CN" dirty="0" smtClean="0"/>
+              <a:t>PG</a:t>
+            </a:r>
+            <a:r>
+              <a:rPr lang="zh-CN" altLang="en-US" dirty="0" smtClean="0"/>
+              <a:t>启动失败，数据不完整</a:t>
+            </a:r>
+            <a:r>
+              <a:rPr lang="en-US" altLang="zh-CN" dirty="0" smtClean="0"/>
+              <a:t>/</a:t>
+            </a:r>
+            <a:r>
+              <a:rPr lang="zh-CN" altLang="en-US" dirty="0" smtClean="0"/>
+              <a:t>丢失</a:t>
+            </a:r>
+            <a:endParaRPr lang="en-US" dirty="0"/>
+          </a:p>
+        </p:txBody>
+      </p:sp>
+    </p:spTree>
+    <p:extLst>
+      <p:ext uri="{BB962C8B-B14F-4D97-AF65-F5344CB8AC3E}">
+        <p14:creationId xmlns:p14="http://schemas.microsoft.com/office/powerpoint/2010/main" val="996487412"/>
+      </p:ext>
+    </p:extLst>
+  </p:cSld>
+  <p:clrMapOvr>
+    <a:masterClrMapping/>
+  </p:clrMapOvr>
+</p:sld>
+</file>
+
 <file path=ppt/theme/theme1.xml><?xml version="1.0" encoding="utf-8"?>
 <a:theme xmlns:a="http://schemas.openxmlformats.org/drawingml/2006/main" name="Office 主题">
   <a:themeElements>

</xml_diff>